<commit_message>
typo logic_formulas, edit normal-forms.pptx
</commit_message>
<xml_diff>
--- a/fall17/slidesF17/normal-forms.pptx
+++ b/fall17/slidesF17/normal-forms.pptx
@@ -5,38 +5,39 @@
     <p:sldMasterId id="2147483650" r:id="rId1"/>
   </p:sldMasterIdLst>
   <p:notesMasterIdLst>
-    <p:notesMasterId r:id="rId23"/>
+    <p:notesMasterId r:id="rId24"/>
   </p:notesMasterIdLst>
   <p:handoutMasterIdLst>
-    <p:handoutMasterId r:id="rId24"/>
+    <p:handoutMasterId r:id="rId25"/>
   </p:handoutMasterIdLst>
   <p:sldIdLst>
     <p:sldId id="392" r:id="rId2"/>
     <p:sldId id="486" r:id="rId3"/>
-    <p:sldId id="466" r:id="rId4"/>
-    <p:sldId id="485" r:id="rId5"/>
-    <p:sldId id="465" r:id="rId6"/>
-    <p:sldId id="467" r:id="rId7"/>
-    <p:sldId id="468" r:id="rId8"/>
-    <p:sldId id="482" r:id="rId9"/>
-    <p:sldId id="481" r:id="rId10"/>
-    <p:sldId id="469" r:id="rId11"/>
-    <p:sldId id="470" r:id="rId12"/>
-    <p:sldId id="471" r:id="rId13"/>
-    <p:sldId id="484" r:id="rId14"/>
-    <p:sldId id="473" r:id="rId15"/>
-    <p:sldId id="474" r:id="rId16"/>
-    <p:sldId id="476" r:id="rId17"/>
-    <p:sldId id="477" r:id="rId18"/>
-    <p:sldId id="478" r:id="rId19"/>
-    <p:sldId id="479" r:id="rId20"/>
-    <p:sldId id="480" r:id="rId21"/>
-    <p:sldId id="483" r:id="rId22"/>
+    <p:sldId id="487" r:id="rId4"/>
+    <p:sldId id="466" r:id="rId5"/>
+    <p:sldId id="488" r:id="rId6"/>
+    <p:sldId id="465" r:id="rId7"/>
+    <p:sldId id="467" r:id="rId8"/>
+    <p:sldId id="468" r:id="rId9"/>
+    <p:sldId id="482" r:id="rId10"/>
+    <p:sldId id="481" r:id="rId11"/>
+    <p:sldId id="469" r:id="rId12"/>
+    <p:sldId id="470" r:id="rId13"/>
+    <p:sldId id="471" r:id="rId14"/>
+    <p:sldId id="484" r:id="rId15"/>
+    <p:sldId id="473" r:id="rId16"/>
+    <p:sldId id="474" r:id="rId17"/>
+    <p:sldId id="476" r:id="rId18"/>
+    <p:sldId id="477" r:id="rId19"/>
+    <p:sldId id="478" r:id="rId20"/>
+    <p:sldId id="479" r:id="rId21"/>
+    <p:sldId id="480" r:id="rId22"/>
+    <p:sldId id="483" r:id="rId23"/>
   </p:sldIdLst>
   <p:sldSz cx="9144000" cy="6858000" type="screen4x3"/>
   <p:notesSz cx="9601200" cy="7315200"/>
   <p:custDataLst>
-    <p:tags r:id="rId25"/>
+    <p:tags r:id="rId27"/>
   </p:custDataLst>
   <p:defaultTextStyle>
     <a:defPPr>
@@ -165,7 +166,7 @@
   </p:defaultTextStyle>
   <p:extLst>
     <p:ext uri="{EFAFB233-063F-42B5-8137-9DF3F51BA10A}">
-      <p15:sldGuideLst xmlns:p15="http://schemas.microsoft.com/office/powerpoint/2012/main">
+      <p15:sldGuideLst xmlns:p15="http://schemas.microsoft.com/office/powerpoint/2012/main" xmlns="">
         <p15:guide id="1" orient="horz" pos="2126">
           <p15:clr>
             <a:srgbClr val="A4A3A4"/>
@@ -179,7 +180,7 @@
       </p15:sldGuideLst>
     </p:ext>
     <p:ext uri="{2D200454-40CA-4A62-9FC3-DE9A4176ACB9}">
-      <p15:notesGuideLst xmlns:p15="http://schemas.microsoft.com/office/powerpoint/2012/main">
+      <p15:notesGuideLst xmlns:p15="http://schemas.microsoft.com/office/powerpoint/2012/main" xmlns="">
         <p15:guide id="1" orient="horz" pos="2304">
           <p15:clr>
             <a:srgbClr val="A4A3A4"/>
@@ -1118,13 +1119,13 @@
   <p:clrMapOvr>
     <a:masterClrMapping/>
   </p:clrMapOvr>
-  <p:transition>
+  <p:transition xmlns:p14="http://schemas.microsoft.com/office/powerpoint/2010/main">
     <p:fade/>
   </p:transition>
   <p:timing>
     <p:tnLst>
       <p:par>
-        <p:cTn id="1" dur="indefinite" restart="never" nodeType="tmRoot"/>
+        <p:cTn xmlns:p14="http://schemas.microsoft.com/office/powerpoint/2010/main" id="1" dur="indefinite" restart="never" nodeType="tmRoot"/>
       </p:par>
     </p:tnLst>
   </p:timing>
@@ -1271,13 +1272,13 @@
   <p:clrMapOvr>
     <a:masterClrMapping/>
   </p:clrMapOvr>
-  <p:transition>
+  <p:transition xmlns:p14="http://schemas.microsoft.com/office/powerpoint/2010/main">
     <p:fade/>
   </p:transition>
   <p:timing>
     <p:tnLst>
       <p:par>
-        <p:cTn id="1" dur="indefinite" restart="never" nodeType="tmRoot"/>
+        <p:cTn xmlns:p14="http://schemas.microsoft.com/office/powerpoint/2010/main" id="1" dur="indefinite" restart="never" nodeType="tmRoot"/>
       </p:par>
     </p:tnLst>
   </p:timing>
@@ -1349,13 +1350,13 @@
   <p:clrMapOvr>
     <a:masterClrMapping/>
   </p:clrMapOvr>
-  <p:transition>
+  <p:transition xmlns:p14="http://schemas.microsoft.com/office/powerpoint/2010/main">
     <p:fade/>
   </p:transition>
   <p:timing>
     <p:tnLst>
       <p:par>
-        <p:cTn id="1" dur="indefinite" restart="never" nodeType="tmRoot"/>
+        <p:cTn xmlns:p14="http://schemas.microsoft.com/office/powerpoint/2010/main" id="1" dur="indefinite" restart="never" nodeType="tmRoot"/>
       </p:par>
     </p:tnLst>
   </p:timing>
@@ -1451,13 +1452,13 @@
   <p:clrMapOvr>
     <a:masterClrMapping/>
   </p:clrMapOvr>
-  <p:transition>
+  <p:transition xmlns:p14="http://schemas.microsoft.com/office/powerpoint/2010/main">
     <p:fade/>
   </p:transition>
   <p:timing>
     <p:tnLst>
       <p:par>
-        <p:cTn id="1" dur="indefinite" restart="never" nodeType="tmRoot"/>
+        <p:cTn xmlns:p14="http://schemas.microsoft.com/office/powerpoint/2010/main" id="1" dur="indefinite" restart="never" nodeType="tmRoot"/>
       </p:par>
     </p:tnLst>
   </p:timing>
@@ -1556,7 +1557,7 @@
   <p:clrMapOvr>
     <a:masterClrMapping/>
   </p:clrMapOvr>
-  <p:transition>
+  <p:transition xmlns:p14="http://schemas.microsoft.com/office/powerpoint/2010/main">
     <p:fade/>
   </p:transition>
 </p:sldLayout>
@@ -1874,13 +1875,13 @@
     <p:sldLayoutId id="2147483665" r:id="rId4"/>
     <p:sldLayoutId id="2147483657" r:id="rId5"/>
   </p:sldLayoutIdLst>
-  <p:transition>
+  <p:transition xmlns:p14="http://schemas.microsoft.com/office/powerpoint/2010/main">
     <p:fade/>
   </p:transition>
   <p:timing>
     <p:tnLst>
       <p:par>
-        <p:cTn id="1" dur="indefinite" restart="never" nodeType="tmRoot"/>
+        <p:cTn xmlns:p14="http://schemas.microsoft.com/office/powerpoint/2010/main" id="1" dur="indefinite" restart="never" nodeType="tmRoot"/>
       </p:par>
     </p:tnLst>
   </p:timing>
@@ -2572,7 +2573,7 @@
   <p:timing>
     <p:tnLst>
       <p:par>
-        <p:cTn id="1" dur="indefinite" restart="never" nodeType="tmRoot"/>
+        <p:cTn xmlns:p14="http://schemas.microsoft.com/office/powerpoint/2010/main" id="1" dur="indefinite" restart="never" nodeType="tmRoot"/>
       </p:par>
     </p:tnLst>
   </p:timing>
@@ -2580,6 +2581,180 @@
 </file>
 
 <file path=ppt/slides/slide10.xml><?xml version="1.0" encoding="utf-8"?>
+<p:sld xmlns:a="http://schemas.openxmlformats.org/drawingml/2006/main" xmlns:r="http://schemas.openxmlformats.org/officeDocument/2006/relationships" xmlns:p="http://schemas.openxmlformats.org/presentationml/2006/main">
+  <p:cSld>
+    <p:spTree>
+      <p:nvGrpSpPr>
+        <p:cNvPr id="1" name=""/>
+        <p:cNvGrpSpPr/>
+        <p:nvPr/>
+      </p:nvGrpSpPr>
+      <p:grpSpPr>
+        <a:xfrm>
+          <a:off x="0" y="0"/>
+          <a:ext cx="0" cy="0"/>
+          <a:chOff x="0" y="0"/>
+          <a:chExt cx="0" cy="0"/>
+        </a:xfrm>
+      </p:grpSpPr>
+      <p:graphicFrame>
+        <p:nvGraphicFramePr>
+          <p:cNvPr id="6" name="Object 5"/>
+          <p:cNvGraphicFramePr>
+            <a:graphicFrameLocks noChangeAspect="1"/>
+          </p:cNvGraphicFramePr>
+          <p:nvPr>
+            <p:extLst>
+              <p:ext uri="{D42A27DB-BD31-4B8C-83A1-F6EECF244321}">
+                <p14:modId xmlns:p14="http://schemas.microsoft.com/office/powerpoint/2010/main" val="2607417037"/>
+              </p:ext>
+            </p:extLst>
+          </p:nvPr>
+        </p:nvGraphicFramePr>
+        <p:xfrm>
+          <a:off x="3246996" y="1147402"/>
+          <a:ext cx="2662707" cy="4440637"/>
+        </p:xfrm>
+        <a:graphic>
+          <a:graphicData uri="http://schemas.openxmlformats.org/presentationml/2006/ole">
+            <mc:AlternateContent xmlns:mc="http://schemas.openxmlformats.org/markup-compatibility/2006">
+              <mc:Choice xmlns:v="urn:schemas-microsoft-com:vml" Requires="v">
+                <p:oleObj spid="_x0000_s12304" name="Equation" r:id="rId3" imgW="533400" imgH="914400" progId="Equation.DSMT4">
+                  <p:embed/>
+                </p:oleObj>
+              </mc:Choice>
+              <mc:Fallback>
+                <p:oleObj name="Equation" r:id="rId3" imgW="533400" imgH="914400" progId="Equation.DSMT4">
+                  <p:embed/>
+                  <p:pic>
+                    <p:nvPicPr>
+                      <p:cNvPr id="0" name=""/>
+                      <p:cNvPicPr/>
+                      <p:nvPr/>
+                    </p:nvPicPr>
+                    <p:blipFill>
+                      <a:blip r:embed="rId4"/>
+                      <a:stretch>
+                        <a:fillRect/>
+                      </a:stretch>
+                    </p:blipFill>
+                    <p:spPr>
+                      <a:xfrm>
+                        <a:off x="3246996" y="1147402"/>
+                        <a:ext cx="2662707" cy="4440637"/>
+                      </a:xfrm>
+                      <a:prstGeom prst="rect">
+                        <a:avLst/>
+                      </a:prstGeom>
+                    </p:spPr>
+                  </p:pic>
+                </p:oleObj>
+              </mc:Fallback>
+            </mc:AlternateContent>
+          </a:graphicData>
+        </a:graphic>
+      </p:graphicFrame>
+      <p:sp>
+        <p:nvSpPr>
+          <p:cNvPr id="3" name="Slide Number Placeholder 2"/>
+          <p:cNvSpPr>
+            <a:spLocks noGrp="1"/>
+          </p:cNvSpPr>
+          <p:nvPr>
+            <p:ph type="sldNum" sz="quarter" idx="10"/>
+          </p:nvPr>
+        </p:nvSpPr>
+        <p:spPr/>
+        <p:txBody>
+          <a:bodyPr/>
+          <a:lstStyle/>
+          <a:p>
+            <a:pPr>
+              <a:defRPr/>
+            </a:pPr>
+            <a:r>
+              <a:rPr lang="en-US" smtClean="0"/>
+              <a:t>forms.</a:t>
+            </a:r>
+            <a:fld id="{068AF58D-0467-409E-A30A-0D5E3A2B197F}" type="slidenum">
+              <a:rPr lang="en-US" smtClean="0"/>
+              <a:pPr>
+                <a:defRPr/>
+              </a:pPr>
+              <a:t>10</a:t>
+            </a:fld>
+            <a:endParaRPr lang="en-US" dirty="0"/>
+          </a:p>
+        </p:txBody>
+      </p:sp>
+      <p:sp>
+        <p:nvSpPr>
+          <p:cNvPr id="7" name="Title 1"/>
+          <p:cNvSpPr>
+            <a:spLocks noGrp="1"/>
+          </p:cNvSpPr>
+          <p:nvPr>
+            <p:ph type="title" sz="quarter"/>
+          </p:nvPr>
+        </p:nvSpPr>
+        <p:spPr/>
+        <p:txBody>
+          <a:bodyPr/>
+          <a:lstStyle/>
+          <a:p>
+            <a:r>
+              <a:rPr lang="en-US" dirty="0" smtClean="0"/>
+              <a:t>Disjunctive Form for </a:t>
+            </a:r>
+            <a:r>
+              <a:rPr lang="en-US" dirty="0" smtClean="0">
+                <a:solidFill>
+                  <a:srgbClr val="0000FF"/>
+                </a:solidFill>
+              </a:rPr>
+              <a:t>M</a:t>
+            </a:r>
+            <a:endParaRPr lang="en-US" dirty="0">
+              <a:solidFill>
+                <a:srgbClr val="0000FF"/>
+              </a:solidFill>
+            </a:endParaRPr>
+          </a:p>
+        </p:txBody>
+      </p:sp>
+    </p:spTree>
+    <p:extLst>
+      <p:ext uri="{BB962C8B-B14F-4D97-AF65-F5344CB8AC3E}">
+        <p14:creationId xmlns:p14="http://schemas.microsoft.com/office/powerpoint/2010/main" val="3206481017"/>
+      </p:ext>
+    </p:extLst>
+  </p:cSld>
+  <p:clrMapOvr>
+    <a:masterClrMapping/>
+  </p:clrMapOvr>
+  <mc:AlternateContent xmlns:mc="http://schemas.openxmlformats.org/markup-compatibility/2006" xmlns:p14="http://schemas.microsoft.com/office/powerpoint/2010/main">
+    <mc:Choice Requires="p14">
+      <p:transition spd="med" p14:dur="700" advClick="0">
+        <p:fade/>
+      </p:transition>
+    </mc:Choice>
+    <mc:Fallback xmlns="">
+      <p:transition xmlns:p14="http://schemas.microsoft.com/office/powerpoint/2010/main" spd="med" advClick="0">
+        <p:fade/>
+      </p:transition>
+    </mc:Fallback>
+  </mc:AlternateContent>
+  <p:timing>
+    <p:tnLst>
+      <p:par>
+        <p:cTn xmlns:p14="http://schemas.microsoft.com/office/powerpoint/2010/main" id="1" dur="indefinite" restart="never" nodeType="tmRoot"/>
+      </p:par>
+    </p:tnLst>
+  </p:timing>
+</p:sld>
+</file>
+
+<file path=ppt/slides/slide11.xml><?xml version="1.0" encoding="utf-8"?>
 <p:sld xmlns:a="http://schemas.openxmlformats.org/drawingml/2006/main" xmlns:r="http://schemas.openxmlformats.org/officeDocument/2006/relationships" xmlns:p="http://schemas.openxmlformats.org/presentationml/2006/main">
   <p:cSld>
     <p:spTree>
@@ -2658,7 +2833,7 @@
               <a:pPr>
                 <a:defRPr/>
               </a:pPr>
-              <a:t>10</a:t>
+              <a:t>11</a:t>
             </a:fld>
             <a:endParaRPr lang="en-US" dirty="0"/>
           </a:p>
@@ -2686,7 +2861,7 @@
           <a:graphicData uri="http://schemas.openxmlformats.org/presentationml/2006/ole">
             <mc:AlternateContent xmlns:mc="http://schemas.openxmlformats.org/markup-compatibility/2006">
               <mc:Choice xmlns:v="urn:schemas-microsoft-com:vml" Requires="v">
-                <p:oleObj spid="_x0000_s3092" name="Equation" r:id="rId3" imgW="1282700" imgH="914400" progId="Equation.DSMT4">
+                <p:oleObj spid="_x0000_s3096" name="Equation" r:id="rId3" imgW="1282700" imgH="914400" progId="Equation.DSMT4">
                   <p:embed/>
                 </p:oleObj>
               </mc:Choice>
@@ -2731,20 +2906,20 @@
   <p:clrMapOvr>
     <a:masterClrMapping/>
   </p:clrMapOvr>
-  <p:transition spd="slow" advClick="0">
+  <p:transition xmlns:p14="http://schemas.microsoft.com/office/powerpoint/2010/main" spd="slow" advClick="0">
     <p:fade/>
   </p:transition>
   <p:timing>
     <p:tnLst>
       <p:par>
-        <p:cTn id="1" dur="indefinite" restart="never" nodeType="tmRoot"/>
+        <p:cTn xmlns:p14="http://schemas.microsoft.com/office/powerpoint/2010/main" id="1" dur="indefinite" restart="never" nodeType="tmRoot"/>
       </p:par>
     </p:tnLst>
   </p:timing>
 </p:sld>
 </file>
 
-<file path=ppt/slides/slide11.xml><?xml version="1.0" encoding="utf-8"?>
+<file path=ppt/slides/slide12.xml><?xml version="1.0" encoding="utf-8"?>
 <p:sld xmlns:a="http://schemas.openxmlformats.org/drawingml/2006/main" xmlns:r="http://schemas.openxmlformats.org/officeDocument/2006/relationships" xmlns:p="http://schemas.openxmlformats.org/presentationml/2006/main">
   <p:cSld>
     <p:spTree>
@@ -2832,7 +3007,7 @@
               <a:pPr>
                 <a:defRPr/>
               </a:pPr>
-              <a:t>11</a:t>
+              <a:t>12</a:t>
             </a:fld>
             <a:endParaRPr lang="en-US" dirty="0"/>
           </a:p>
@@ -2895,7 +3070,7 @@
           <a:graphicData uri="http://schemas.openxmlformats.org/presentationml/2006/ole">
             <mc:AlternateContent xmlns:mc="http://schemas.openxmlformats.org/markup-compatibility/2006">
               <mc:Choice xmlns:v="urn:schemas-microsoft-com:vml" Requires="v">
-                <p:oleObj spid="_x0000_s4116" name="Equation" r:id="rId3" imgW="1282700" imgH="914400" progId="Equation.DSMT4">
+                <p:oleObj spid="_x0000_s4119" name="Equation" r:id="rId3" imgW="1282700" imgH="914400" progId="Equation.DSMT4">
                   <p:embed/>
                 </p:oleObj>
               </mc:Choice>
@@ -2940,13 +3115,13 @@
   <p:clrMapOvr>
     <a:masterClrMapping/>
   </p:clrMapOvr>
-  <p:transition spd="slow" advClick="0">
+  <p:transition xmlns:p14="http://schemas.microsoft.com/office/powerpoint/2010/main" spd="slow" advClick="0">
     <p:fade/>
   </p:transition>
   <p:timing>
     <p:tnLst>
       <p:par>
-        <p:cTn id="1" dur="indefinite" restart="never" nodeType="tmRoot">
+        <p:cTn xmlns:p14="http://schemas.microsoft.com/office/powerpoint/2010/main" id="1" dur="indefinite" restart="never" nodeType="tmRoot">
           <p:childTnLst>
             <p:seq concurrent="1" nextAc="seek">
               <p:cTn id="2" dur="indefinite" nodeType="mainSeq">
@@ -3032,7 +3207,7 @@
 </p:sld>
 </file>
 
-<file path=ppt/slides/slide12.xml><?xml version="1.0" encoding="utf-8"?>
+<file path=ppt/slides/slide13.xml><?xml version="1.0" encoding="utf-8"?>
 <p:sld xmlns:a="http://schemas.openxmlformats.org/drawingml/2006/main" xmlns:r="http://schemas.openxmlformats.org/officeDocument/2006/relationships" xmlns:p="http://schemas.openxmlformats.org/presentationml/2006/main">
   <p:cSld>
     <p:spTree>
@@ -3113,7 +3288,7 @@
               <a:pPr>
                 <a:defRPr/>
               </a:pPr>
-              <a:t>12</a:t>
+              <a:t>13</a:t>
             </a:fld>
             <a:endParaRPr lang="en-US" dirty="0"/>
           </a:p>
@@ -3185,7 +3360,7 @@
   <p:timing>
     <p:tnLst>
       <p:par>
-        <p:cTn id="1" dur="indefinite" restart="never" nodeType="tmRoot">
+        <p:cTn xmlns:p14="http://schemas.microsoft.com/office/powerpoint/2010/main" id="1" dur="indefinite" restart="never" nodeType="tmRoot">
           <p:childTnLst>
             <p:seq concurrent="1" nextAc="seek">
               <p:cTn id="2" dur="indefinite" nodeType="mainSeq">
@@ -3271,7 +3446,7 @@
 </p:sld>
 </file>
 
-<file path=ppt/slides/slide13.xml><?xml version="1.0" encoding="utf-8"?>
+<file path=ppt/slides/slide14.xml><?xml version="1.0" encoding="utf-8"?>
 <p:sld xmlns:a="http://schemas.openxmlformats.org/drawingml/2006/main" xmlns:r="http://schemas.openxmlformats.org/officeDocument/2006/relationships" xmlns:p="http://schemas.openxmlformats.org/presentationml/2006/main">
   <p:cSld>
     <p:spTree>
@@ -3352,7 +3527,7 @@
               <a:pPr>
                 <a:defRPr/>
               </a:pPr>
-              <a:t>13</a:t>
+              <a:t>14</a:t>
             </a:fld>
             <a:endParaRPr lang="en-US" dirty="0"/>
           </a:p>
@@ -3478,7 +3653,7 @@
   <p:timing>
     <p:tnLst>
       <p:par>
-        <p:cTn id="1" dur="indefinite" restart="never" nodeType="tmRoot">
+        <p:cTn xmlns:p14="http://schemas.microsoft.com/office/powerpoint/2010/main" id="1" dur="indefinite" restart="never" nodeType="tmRoot">
           <p:childTnLst>
             <p:seq concurrent="1" nextAc="seek">
               <p:cTn id="2" dur="indefinite" nodeType="mainSeq">
@@ -3569,7 +3744,7 @@
 </p:sld>
 </file>
 
-<file path=ppt/slides/slide14.xml><?xml version="1.0" encoding="utf-8"?>
+<file path=ppt/slides/slide15.xml><?xml version="1.0" encoding="utf-8"?>
 <p:sld xmlns:a="http://schemas.openxmlformats.org/drawingml/2006/main" xmlns:r="http://schemas.openxmlformats.org/officeDocument/2006/relationships" xmlns:p="http://schemas.openxmlformats.org/presentationml/2006/main">
   <p:cSld>
     <p:spTree>
@@ -3640,7 +3815,7 @@
               <a:pPr>
                 <a:defRPr/>
               </a:pPr>
-              <a:t>14</a:t>
+              <a:t>15</a:t>
             </a:fld>
             <a:endParaRPr lang="en-US" dirty="0"/>
           </a:p>
@@ -3783,7 +3958,7 @@
   <p:timing>
     <p:tnLst>
       <p:par>
-        <p:cTn id="1" dur="indefinite" restart="never" nodeType="tmRoot">
+        <p:cTn xmlns:p14="http://schemas.microsoft.com/office/powerpoint/2010/main" id="1" dur="indefinite" restart="never" nodeType="tmRoot">
           <p:childTnLst>
             <p:seq concurrent="1" nextAc="seek">
               <p:cTn id="2" dur="indefinite" nodeType="mainSeq">
@@ -3923,7 +4098,7 @@
 </p:sld>
 </file>
 
-<file path=ppt/slides/slide15.xml><?xml version="1.0" encoding="utf-8"?>
+<file path=ppt/slides/slide16.xml><?xml version="1.0" encoding="utf-8"?>
 <p:sld xmlns:a="http://schemas.openxmlformats.org/drawingml/2006/main" xmlns:r="http://schemas.openxmlformats.org/officeDocument/2006/relationships" xmlns:p="http://schemas.openxmlformats.org/presentationml/2006/main">
   <p:cSld>
     <p:spTree>
@@ -4002,7 +4177,7 @@
               <a:pPr>
                 <a:defRPr/>
               </a:pPr>
-              <a:t>15</a:t>
+              <a:t>16</a:t>
             </a:fld>
             <a:endParaRPr lang="en-US" dirty="0"/>
           </a:p>
@@ -4101,7 +4276,7 @@
           <a:graphicData uri="http://schemas.openxmlformats.org/presentationml/2006/ole">
             <mc:AlternateContent xmlns:mc="http://schemas.openxmlformats.org/markup-compatibility/2006">
               <mc:Choice xmlns:v="urn:schemas-microsoft-com:vml" Requires="v">
-                <p:oleObj spid="_x0000_s5138" name="Equation" r:id="rId3" imgW="1473200" imgH="254000" progId="Equation.DSMT4">
+                <p:oleObj spid="_x0000_s5141" name="Equation" r:id="rId3" imgW="1473200" imgH="254000" progId="Equation.DSMT4">
                   <p:embed/>
                 </p:oleObj>
               </mc:Choice>
@@ -4190,13 +4365,13 @@
   <p:clrMapOvr>
     <a:masterClrMapping/>
   </p:clrMapOvr>
-  <p:transition>
+  <p:transition xmlns:p14="http://schemas.microsoft.com/office/powerpoint/2010/main">
     <p:fade/>
   </p:transition>
   <p:timing>
     <p:tnLst>
       <p:par>
-        <p:cTn id="1" dur="indefinite" restart="never" nodeType="tmRoot">
+        <p:cTn xmlns:p14="http://schemas.microsoft.com/office/powerpoint/2010/main" id="1" dur="indefinite" restart="never" nodeType="tmRoot">
           <p:childTnLst>
             <p:seq concurrent="1" nextAc="seek">
               <p:cTn id="2" dur="indefinite" nodeType="mainSeq">
@@ -4335,7 +4510,7 @@
 </p:sld>
 </file>
 
-<file path=ppt/slides/slide16.xml><?xml version="1.0" encoding="utf-8"?>
+<file path=ppt/slides/slide17.xml><?xml version="1.0" encoding="utf-8"?>
 <p:sld xmlns:a="http://schemas.openxmlformats.org/drawingml/2006/main" xmlns:r="http://schemas.openxmlformats.org/officeDocument/2006/relationships" xmlns:p="http://schemas.openxmlformats.org/presentationml/2006/main">
   <p:cSld>
     <p:spTree>
@@ -4374,7 +4549,7 @@
           <a:graphicData uri="http://schemas.openxmlformats.org/presentationml/2006/ole">
             <mc:AlternateContent xmlns:mc="http://schemas.openxmlformats.org/markup-compatibility/2006">
               <mc:Choice xmlns:v="urn:schemas-microsoft-com:vml" Requires="v">
-                <p:oleObj spid="_x0000_s7200" name="Equation" r:id="rId3" imgW="762000" imgH="469900" progId="Equation.DSMT4">
+                <p:oleObj spid="_x0000_s7205" name="Equation" r:id="rId3" imgW="762000" imgH="469900" progId="Equation.DSMT4">
                   <p:embed/>
                 </p:oleObj>
               </mc:Choice>
@@ -4471,7 +4646,7 @@
               <a:pPr>
                 <a:defRPr/>
               </a:pPr>
-              <a:t>16</a:t>
+              <a:t>17</a:t>
             </a:fld>
             <a:endParaRPr lang="en-US" dirty="0"/>
           </a:p>
@@ -4570,7 +4745,7 @@
           <a:graphicData uri="http://schemas.openxmlformats.org/presentationml/2006/ole">
             <mc:AlternateContent xmlns:mc="http://schemas.openxmlformats.org/markup-compatibility/2006">
               <mc:Choice xmlns:v="urn:schemas-microsoft-com:vml" Requires="v">
-                <p:oleObj spid="_x0000_s7201" name="Equation" r:id="rId5" imgW="927100" imgH="254000" progId="Equation.DSMT4">
+                <p:oleObj spid="_x0000_s7206" name="Equation" r:id="rId5" imgW="927100" imgH="254000" progId="Equation.DSMT4">
                   <p:embed/>
                 </p:oleObj>
               </mc:Choice>
@@ -4659,13 +4834,13 @@
   <p:clrMapOvr>
     <a:masterClrMapping/>
   </p:clrMapOvr>
-  <p:transition spd="slow" advClick="0">
+  <p:transition xmlns:p14="http://schemas.microsoft.com/office/powerpoint/2010/main" spd="slow" advClick="0">
     <p:fade/>
   </p:transition>
   <p:timing>
     <p:tnLst>
       <p:par>
-        <p:cTn id="1" dur="indefinite" restart="never" nodeType="tmRoot">
+        <p:cTn xmlns:p14="http://schemas.microsoft.com/office/powerpoint/2010/main" id="1" dur="indefinite" restart="never" nodeType="tmRoot">
           <p:childTnLst>
             <p:seq concurrent="1" nextAc="seek">
               <p:cTn id="2" dur="indefinite" nodeType="mainSeq">
@@ -4859,7 +5034,7 @@
 </p:sld>
 </file>
 
-<file path=ppt/slides/slide17.xml><?xml version="1.0" encoding="utf-8"?>
+<file path=ppt/slides/slide18.xml><?xml version="1.0" encoding="utf-8"?>
 <p:sld xmlns:a="http://schemas.openxmlformats.org/drawingml/2006/main" xmlns:r="http://schemas.openxmlformats.org/officeDocument/2006/relationships" xmlns:p="http://schemas.openxmlformats.org/presentationml/2006/main">
   <p:cSld>
     <p:spTree>
@@ -4898,7 +5073,7 @@
           <a:graphicData uri="http://schemas.openxmlformats.org/presentationml/2006/ole">
             <mc:AlternateContent xmlns:mc="http://schemas.openxmlformats.org/markup-compatibility/2006">
               <mc:Choice xmlns:v="urn:schemas-microsoft-com:vml" Requires="v">
-                <p:oleObj spid="_x0000_s8209" name="Equation" r:id="rId3" imgW="1155700" imgH="482600" progId="Equation.DSMT4">
+                <p:oleObj spid="_x0000_s8212" name="Equation" r:id="rId3" imgW="1155700" imgH="482600" progId="Equation.DSMT4">
                   <p:embed/>
                 </p:oleObj>
               </mc:Choice>
@@ -5015,7 +5190,7 @@
               <a:pPr>
                 <a:defRPr/>
               </a:pPr>
-              <a:t>17</a:t>
+              <a:t>18</a:t>
             </a:fld>
             <a:endParaRPr lang="en-US" dirty="0"/>
           </a:p>
@@ -5072,13 +5247,13 @@
   <p:clrMapOvr>
     <a:masterClrMapping/>
   </p:clrMapOvr>
-  <p:transition>
+  <p:transition xmlns:p14="http://schemas.microsoft.com/office/powerpoint/2010/main">
     <p:fade/>
   </p:transition>
   <p:timing>
     <p:tnLst>
       <p:par>
-        <p:cTn id="1" dur="indefinite" restart="never" nodeType="tmRoot">
+        <p:cTn xmlns:p14="http://schemas.microsoft.com/office/powerpoint/2010/main" id="1" dur="indefinite" restart="never" nodeType="tmRoot">
           <p:childTnLst>
             <p:seq concurrent="1" nextAc="seek">
               <p:cTn id="2" dur="indefinite" nodeType="mainSeq">
@@ -5217,7 +5392,7 @@
 </p:sld>
 </file>
 
-<file path=ppt/slides/slide18.xml><?xml version="1.0" encoding="utf-8"?>
+<file path=ppt/slides/slide19.xml><?xml version="1.0" encoding="utf-8"?>
 <p:sld xmlns:a="http://schemas.openxmlformats.org/drawingml/2006/main" xmlns:r="http://schemas.openxmlformats.org/officeDocument/2006/relationships" xmlns:p="http://schemas.openxmlformats.org/presentationml/2006/main">
   <p:cSld>
     <p:spTree>
@@ -5313,7 +5488,7 @@
               <a:pPr>
                 <a:defRPr/>
               </a:pPr>
-              <a:t>18</a:t>
+              <a:t>19</a:t>
             </a:fld>
             <a:endParaRPr lang="en-US" dirty="0"/>
           </a:p>
@@ -5341,7 +5516,7 @@
           <a:graphicData uri="http://schemas.openxmlformats.org/presentationml/2006/ole">
             <mc:AlternateContent xmlns:mc="http://schemas.openxmlformats.org/markup-compatibility/2006">
               <mc:Choice xmlns:v="urn:schemas-microsoft-com:vml" Requires="v">
-                <p:oleObj spid="_x0000_s10257" name="Equation" r:id="rId3" imgW="1181100" imgH="939800" progId="Equation.DSMT4">
+                <p:oleObj spid="_x0000_s10260" name="Equation" r:id="rId3" imgW="1181100" imgH="939800" progId="Equation.DSMT4">
                   <p:embed/>
                 </p:oleObj>
               </mc:Choice>
@@ -5386,20 +5561,264 @@
   <p:clrMapOvr>
     <a:masterClrMapping/>
   </p:clrMapOvr>
-  <p:transition spd="slow" advClick="0">
+  <p:transition xmlns:p14="http://schemas.microsoft.com/office/powerpoint/2010/main" spd="slow" advClick="0">
     <p:fade/>
   </p:transition>
   <p:timing>
     <p:tnLst>
       <p:par>
-        <p:cTn id="1" dur="indefinite" restart="never" nodeType="tmRoot"/>
+        <p:cTn xmlns:p14="http://schemas.microsoft.com/office/powerpoint/2010/main" id="1" dur="indefinite" restart="never" nodeType="tmRoot"/>
       </p:par>
     </p:tnLst>
   </p:timing>
 </p:sld>
 </file>
 
-<file path=ppt/slides/slide19.xml><?xml version="1.0" encoding="utf-8"?>
+<file path=ppt/slides/slide2.xml><?xml version="1.0" encoding="utf-8"?>
+<p:sld xmlns:a="http://schemas.openxmlformats.org/drawingml/2006/main" xmlns:r="http://schemas.openxmlformats.org/officeDocument/2006/relationships" xmlns:p="http://schemas.openxmlformats.org/presentationml/2006/main">
+  <p:cSld>
+    <p:spTree>
+      <p:nvGrpSpPr>
+        <p:cNvPr id="1" name=""/>
+        <p:cNvGrpSpPr/>
+        <p:nvPr/>
+      </p:nvGrpSpPr>
+      <p:grpSpPr>
+        <a:xfrm>
+          <a:off x="0" y="0"/>
+          <a:ext cx="0" cy="0"/>
+          <a:chOff x="0" y="0"/>
+          <a:chExt cx="0" cy="0"/>
+        </a:xfrm>
+      </p:grpSpPr>
+      <p:sp>
+        <p:nvSpPr>
+          <p:cNvPr id="2" name="Title 1"/>
+          <p:cNvSpPr>
+            <a:spLocks noGrp="1"/>
+          </p:cNvSpPr>
+          <p:nvPr>
+            <p:ph type="title" sz="quarter"/>
+          </p:nvPr>
+        </p:nvSpPr>
+        <p:spPr/>
+        <p:txBody>
+          <a:bodyPr/>
+          <a:lstStyle/>
+          <a:p>
+            <a:r>
+              <a:rPr lang="en-US" dirty="0" smtClean="0"/>
+              <a:t>        </a:t>
+            </a:r>
+            <a:r>
+              <a:rPr lang="en-US" sz="5400" dirty="0" smtClean="0">
+                <a:solidFill>
+                  <a:srgbClr val="BB0FAB"/>
+                </a:solidFill>
+              </a:rPr>
+              <a:t>Literals</a:t>
+            </a:r>
+            <a:endParaRPr lang="en-US" sz="5400" dirty="0">
+              <a:solidFill>
+                <a:srgbClr val="BB0FAB"/>
+              </a:solidFill>
+            </a:endParaRPr>
+          </a:p>
+        </p:txBody>
+      </p:sp>
+      <p:sp>
+        <p:nvSpPr>
+          <p:cNvPr id="3" name="Slide Number Placeholder 2"/>
+          <p:cNvSpPr>
+            <a:spLocks noGrp="1"/>
+          </p:cNvSpPr>
+          <p:nvPr>
+            <p:ph type="sldNum" sz="quarter" idx="10"/>
+          </p:nvPr>
+        </p:nvSpPr>
+        <p:spPr/>
+        <p:txBody>
+          <a:bodyPr/>
+          <a:lstStyle/>
+          <a:p>
+            <a:pPr>
+              <a:defRPr/>
+            </a:pPr>
+            <a:r>
+              <a:rPr lang="en-US" smtClean="0"/>
+              <a:t>forms.</a:t>
+            </a:r>
+            <a:fld id="{068AF58D-0467-409E-A30A-0D5E3A2B197F}" type="slidenum">
+              <a:rPr lang="en-US" smtClean="0"/>
+              <a:pPr>
+                <a:defRPr/>
+              </a:pPr>
+              <a:t>2</a:t>
+            </a:fld>
+            <a:endParaRPr lang="en-US" dirty="0"/>
+          </a:p>
+        </p:txBody>
+      </p:sp>
+      <p:sp>
+        <p:nvSpPr>
+          <p:cNvPr id="4" name="TextBox 3"/>
+          <p:cNvSpPr txBox="1"/>
+          <p:nvPr/>
+        </p:nvSpPr>
+        <p:spPr>
+          <a:xfrm>
+            <a:off x="607391" y="1988908"/>
+            <a:ext cx="7781172" cy="2769989"/>
+          </a:xfrm>
+          <a:prstGeom prst="rect">
+            <a:avLst/>
+          </a:prstGeom>
+          <a:noFill/>
+        </p:spPr>
+        <p:txBody>
+          <a:bodyPr wrap="none" rtlCol="0">
+            <a:spAutoFit/>
+          </a:bodyPr>
+          <a:lstStyle/>
+          <a:p>
+            <a:pPr algn="l"/>
+            <a:r>
+              <a:rPr lang="en-US" sz="5400" dirty="0" smtClean="0">
+                <a:latin typeface="Comic Sans MS" pitchFamily="66" charset="0"/>
+              </a:rPr>
+              <a:t>A propositional </a:t>
+            </a:r>
+            <a:r>
+              <a:rPr lang="en-US" sz="5400" dirty="0" smtClean="0">
+                <a:solidFill>
+                  <a:schemeClr val="accent1">
+                    <a:lumMod val="50000"/>
+                  </a:schemeClr>
+                </a:solidFill>
+                <a:latin typeface="Comic Sans MS" pitchFamily="66" charset="0"/>
+              </a:rPr>
+              <a:t>variable</a:t>
+            </a:r>
+            <a:r>
+              <a:rPr lang="en-US" sz="5400" dirty="0" smtClean="0">
+                <a:latin typeface="Comic Sans MS" pitchFamily="66" charset="0"/>
+              </a:rPr>
+              <a:t> </a:t>
+            </a:r>
+          </a:p>
+          <a:p>
+            <a:pPr algn="l"/>
+            <a:r>
+              <a:rPr lang="en-US" sz="5400" dirty="0">
+                <a:latin typeface="Comic Sans MS" pitchFamily="66" charset="0"/>
+              </a:rPr>
+              <a:t>o</a:t>
+            </a:r>
+            <a:r>
+              <a:rPr lang="en-US" sz="5400" dirty="0" smtClean="0">
+                <a:latin typeface="Comic Sans MS" pitchFamily="66" charset="0"/>
+              </a:rPr>
+              <a:t>r its </a:t>
+            </a:r>
+            <a:r>
+              <a:rPr lang="en-US" sz="5400" dirty="0" smtClean="0">
+                <a:latin typeface="Comic Sans MS" pitchFamily="66" charset="0"/>
+              </a:rPr>
+              <a:t>negation</a:t>
+            </a:r>
+          </a:p>
+          <a:p>
+            <a:pPr lvl="0" algn="l"/>
+            <a:endParaRPr lang="en-US" sz="6600" dirty="0">
+              <a:solidFill>
+                <a:srgbClr val="000000"/>
+              </a:solidFill>
+              <a:latin typeface="Comic Sans MS" pitchFamily="66" charset="0"/>
+            </a:endParaRPr>
+          </a:p>
+        </p:txBody>
+      </p:sp>
+      <p:graphicFrame>
+        <p:nvGraphicFramePr>
+          <p:cNvPr id="5" name="Object 4"/>
+          <p:cNvGraphicFramePr>
+            <a:graphicFrameLocks noChangeAspect="1"/>
+          </p:cNvGraphicFramePr>
+          <p:nvPr>
+            <p:extLst>
+              <p:ext uri="{D42A27DB-BD31-4B8C-83A1-F6EECF244321}">
+                <p14:modId xmlns:p14="http://schemas.microsoft.com/office/powerpoint/2010/main" val="4290290918"/>
+              </p:ext>
+            </p:extLst>
+          </p:nvPr>
+        </p:nvGraphicFramePr>
+        <p:xfrm>
+          <a:off x="2190803" y="3860362"/>
+          <a:ext cx="4796121" cy="1453370"/>
+        </p:xfrm>
+        <a:graphic>
+          <a:graphicData uri="http://schemas.openxmlformats.org/presentationml/2006/ole">
+            <mc:AlternateContent xmlns:mc="http://schemas.openxmlformats.org/markup-compatibility/2006">
+              <mc:Choice xmlns:v="urn:schemas-microsoft-com:vml" Requires="v">
+                <p:oleObj spid="_x0000_s22530" name="Equation" r:id="rId3" imgW="838200" imgH="254000" progId="Equation.DSMT4">
+                  <p:embed/>
+                </p:oleObj>
+              </mc:Choice>
+              <mc:Fallback>
+                <p:oleObj name="Equation" r:id="rId3" imgW="838200" imgH="254000" progId="Equation.DSMT4">
+                  <p:embed/>
+                  <p:pic>
+                    <p:nvPicPr>
+                      <p:cNvPr id="0" name=""/>
+                      <p:cNvPicPr/>
+                      <p:nvPr/>
+                    </p:nvPicPr>
+                    <p:blipFill>
+                      <a:blip r:embed="rId4"/>
+                      <a:stretch>
+                        <a:fillRect/>
+                      </a:stretch>
+                    </p:blipFill>
+                    <p:spPr>
+                      <a:xfrm>
+                        <a:off x="2190803" y="3860362"/>
+                        <a:ext cx="4796121" cy="1453370"/>
+                      </a:xfrm>
+                      <a:prstGeom prst="rect">
+                        <a:avLst/>
+                      </a:prstGeom>
+                    </p:spPr>
+                  </p:pic>
+                </p:oleObj>
+              </mc:Fallback>
+            </mc:AlternateContent>
+          </a:graphicData>
+        </a:graphic>
+      </p:graphicFrame>
+    </p:spTree>
+    <p:extLst>
+      <p:ext uri="{BB962C8B-B14F-4D97-AF65-F5344CB8AC3E}">
+        <p14:creationId xmlns:p14="http://schemas.microsoft.com/office/powerpoint/2010/main" val="361416435"/>
+      </p:ext>
+    </p:extLst>
+  </p:cSld>
+  <p:clrMapOvr>
+    <a:masterClrMapping/>
+  </p:clrMapOvr>
+  <p:transition xmlns:p14="http://schemas.microsoft.com/office/powerpoint/2010/main">
+    <p:fade/>
+  </p:transition>
+  <p:timing>
+    <p:tnLst>
+      <p:par>
+        <p:cTn xmlns:p14="http://schemas.microsoft.com/office/powerpoint/2010/main" id="1" dur="indefinite" restart="never" nodeType="tmRoot"/>
+      </p:par>
+    </p:tnLst>
+  </p:timing>
+</p:sld>
+</file>
+
+<file path=ppt/slides/slide20.xml><?xml version="1.0" encoding="utf-8"?>
 <p:sld xmlns:a="http://schemas.openxmlformats.org/drawingml/2006/main" xmlns:r="http://schemas.openxmlformats.org/officeDocument/2006/relationships" xmlns:p="http://schemas.openxmlformats.org/presentationml/2006/main">
   <p:cSld>
     <p:spTree>
@@ -5495,7 +5914,7 @@
               <a:pPr>
                 <a:defRPr/>
               </a:pPr>
-              <a:t>19</a:t>
+              <a:t>20</a:t>
             </a:fld>
             <a:endParaRPr lang="en-US" dirty="0"/>
           </a:p>
@@ -5523,7 +5942,7 @@
           <a:graphicData uri="http://schemas.openxmlformats.org/presentationml/2006/ole">
             <mc:AlternateContent xmlns:mc="http://schemas.openxmlformats.org/markup-compatibility/2006">
               <mc:Choice xmlns:v="urn:schemas-microsoft-com:vml" Requires="v">
-                <p:oleObj spid="_x0000_s11280" name="Equation" r:id="rId3" imgW="1181100" imgH="939800" progId="Equation.DSMT4">
+                <p:oleObj spid="_x0000_s11283" name="Equation" r:id="rId3" imgW="1181100" imgH="939800" progId="Equation.DSMT4">
                   <p:embed/>
                 </p:oleObj>
               </mc:Choice>
@@ -5618,363 +6037,14 @@
   <p:timing>
     <p:tnLst>
       <p:par>
-        <p:cTn id="1" dur="indefinite" restart="never" nodeType="tmRoot"/>
+        <p:cTn xmlns:p14="http://schemas.microsoft.com/office/powerpoint/2010/main" id="1" dur="indefinite" restart="never" nodeType="tmRoot"/>
       </p:par>
     </p:tnLst>
   </p:timing>
 </p:sld>
 </file>
 
-<file path=ppt/slides/slide2.xml><?xml version="1.0" encoding="utf-8"?>
-<p:sld xmlns:a="http://schemas.openxmlformats.org/drawingml/2006/main" xmlns:r="http://schemas.openxmlformats.org/officeDocument/2006/relationships" xmlns:p="http://schemas.openxmlformats.org/presentationml/2006/main">
-  <p:cSld>
-    <p:spTree>
-      <p:nvGrpSpPr>
-        <p:cNvPr id="1" name=""/>
-        <p:cNvGrpSpPr/>
-        <p:nvPr/>
-      </p:nvGrpSpPr>
-      <p:grpSpPr>
-        <a:xfrm>
-          <a:off x="0" y="0"/>
-          <a:ext cx="0" cy="0"/>
-          <a:chOff x="0" y="0"/>
-          <a:chExt cx="0" cy="0"/>
-        </a:xfrm>
-      </p:grpSpPr>
-      <p:sp>
-        <p:nvSpPr>
-          <p:cNvPr id="2" name="Title 1"/>
-          <p:cNvSpPr>
-            <a:spLocks noGrp="1"/>
-          </p:cNvSpPr>
-          <p:nvPr>
-            <p:ph type="title" sz="quarter"/>
-          </p:nvPr>
-        </p:nvSpPr>
-        <p:spPr/>
-        <p:txBody>
-          <a:bodyPr/>
-          <a:lstStyle/>
-          <a:p>
-            <a:r>
-              <a:rPr lang="en-US" dirty="0" smtClean="0"/>
-              <a:t>        </a:t>
-            </a:r>
-            <a:r>
-              <a:rPr lang="en-US" sz="5400" dirty="0" smtClean="0"/>
-              <a:t>Literals</a:t>
-            </a:r>
-            <a:endParaRPr lang="en-US" sz="5400" dirty="0"/>
-          </a:p>
-        </p:txBody>
-      </p:sp>
-      <p:sp>
-        <p:nvSpPr>
-          <p:cNvPr id="3" name="Slide Number Placeholder 2"/>
-          <p:cNvSpPr>
-            <a:spLocks noGrp="1"/>
-          </p:cNvSpPr>
-          <p:nvPr>
-            <p:ph type="sldNum" sz="quarter" idx="10"/>
-          </p:nvPr>
-        </p:nvSpPr>
-        <p:spPr/>
-        <p:txBody>
-          <a:bodyPr/>
-          <a:lstStyle/>
-          <a:p>
-            <a:pPr>
-              <a:defRPr/>
-            </a:pPr>
-            <a:r>
-              <a:rPr lang="en-US" smtClean="0"/>
-              <a:t>forms.</a:t>
-            </a:r>
-            <a:fld id="{068AF58D-0467-409E-A30A-0D5E3A2B197F}" type="slidenum">
-              <a:rPr lang="en-US" smtClean="0"/>
-              <a:pPr>
-                <a:defRPr/>
-              </a:pPr>
-              <a:t>2</a:t>
-            </a:fld>
-            <a:endParaRPr lang="en-US" dirty="0"/>
-          </a:p>
-        </p:txBody>
-      </p:sp>
-      <mc:AlternateContent xmlns:mc="http://schemas.openxmlformats.org/markup-compatibility/2006">
-        <mc:Choice xmlns:a14="http://schemas.microsoft.com/office/drawing/2010/main" Requires="a14">
-          <p:sp>
-            <p:nvSpPr>
-              <p:cNvPr id="4" name="TextBox 3"/>
-              <p:cNvSpPr txBox="1"/>
-              <p:nvPr/>
-            </p:nvSpPr>
-            <p:spPr>
-              <a:xfrm>
-                <a:off x="579864" y="1817647"/>
-                <a:ext cx="7986482" cy="2772234"/>
-              </a:xfrm>
-              <a:prstGeom prst="rect">
-                <a:avLst/>
-              </a:prstGeom>
-              <a:noFill/>
-            </p:spPr>
-            <p:txBody>
-              <a:bodyPr wrap="none" rtlCol="0">
-                <a:spAutoFit/>
-              </a:bodyPr>
-              <a:lstStyle/>
-              <a:p>
-                <a:pPr algn="l"/>
-                <a:r>
-                  <a:rPr lang="en-US" sz="5400" dirty="0" smtClean="0">
-                    <a:latin typeface="Comic Sans MS" pitchFamily="66" charset="0"/>
-                  </a:rPr>
-                  <a:t>A propositional </a:t>
-                </a:r>
-                <a:r>
-                  <a:rPr lang="en-US" sz="5400" dirty="0" smtClean="0">
-                    <a:solidFill>
-                      <a:schemeClr val="accent1">
-                        <a:lumMod val="50000"/>
-                      </a:schemeClr>
-                    </a:solidFill>
-                    <a:latin typeface="Comic Sans MS" pitchFamily="66" charset="0"/>
-                  </a:rPr>
-                  <a:t>variable</a:t>
-                </a:r>
-                <a:r>
-                  <a:rPr lang="en-US" sz="5400" dirty="0" smtClean="0">
-                    <a:latin typeface="Comic Sans MS" pitchFamily="66" charset="0"/>
-                  </a:rPr>
-                  <a:t> </a:t>
-                </a:r>
-              </a:p>
-              <a:p>
-                <a:pPr algn="l"/>
-                <a:r>
-                  <a:rPr lang="en-US" sz="5400" dirty="0">
-                    <a:latin typeface="Comic Sans MS" pitchFamily="66" charset="0"/>
-                  </a:rPr>
-                  <a:t>o</a:t>
-                </a:r>
-                <a:r>
-                  <a:rPr lang="en-US" sz="5400" dirty="0" smtClean="0">
-                    <a:latin typeface="Comic Sans MS" pitchFamily="66" charset="0"/>
-                  </a:rPr>
-                  <a:t>r its negation</a:t>
-                </a:r>
-                <a:endParaRPr lang="en-US" sz="5400" dirty="0">
-                  <a:latin typeface="Comic Sans MS" pitchFamily="66" charset="0"/>
-                </a:endParaRPr>
-              </a:p>
-              <a:p>
-                <a:pPr lvl="0" algn="l"/>
-                <a:r>
-                  <a:rPr lang="en-US" sz="6600" i="1" dirty="0" smtClean="0">
-                    <a:latin typeface="Comic Sans MS" pitchFamily="66" charset="0"/>
-                  </a:rPr>
-                  <a:t>         </a:t>
-                </a:r>
-                <a:r>
-                  <a:rPr lang="en-US" sz="6600" i="1" dirty="0" smtClean="0">
-                    <a:solidFill>
-                      <a:schemeClr val="accent1">
-                        <a:lumMod val="50000"/>
-                      </a:schemeClr>
-                    </a:solidFill>
-                    <a:latin typeface="Comic Sans MS" pitchFamily="66" charset="0"/>
-                  </a:rPr>
-                  <a:t>P</a:t>
-                </a:r>
-                <a:r>
-                  <a:rPr lang="en-US" sz="6600" i="1" dirty="0" smtClean="0">
-                    <a:latin typeface="Comic Sans MS" pitchFamily="66" charset="0"/>
-                  </a:rPr>
-                  <a:t>, </a:t>
-                </a:r>
-                <a:r>
-                  <a:rPr lang="en-US" sz="6600" i="1" dirty="0" smtClean="0">
-                    <a:solidFill>
-                      <a:schemeClr val="accent1">
-                        <a:lumMod val="50000"/>
-                      </a:schemeClr>
-                    </a:solidFill>
-                    <a:latin typeface="Comic Sans MS" pitchFamily="66" charset="0"/>
-                  </a:rPr>
-                  <a:t>Q</a:t>
-                </a:r>
-                <a:r>
-                  <a:rPr lang="en-US" sz="6600" i="1" dirty="0" smtClean="0">
-                    <a:latin typeface="Comic Sans MS" pitchFamily="66" charset="0"/>
-                  </a:rPr>
-                  <a:t>, </a:t>
-                </a:r>
-                <a14:m>
-                  <m:oMath xmlns:m="http://schemas.openxmlformats.org/officeDocument/2006/math">
-                    <m:acc>
-                      <m:accPr>
-                        <m:chr m:val="̅"/>
-                        <m:ctrlPr>
-                          <a:rPr lang="en-US" sz="6600" i="1" smtClean="0">
-                            <a:solidFill>
-                              <a:schemeClr val="accent1">
-                                <a:lumMod val="50000"/>
-                              </a:schemeClr>
-                            </a:solidFill>
-                            <a:latin typeface="Cambria Math" charset="0"/>
-                          </a:rPr>
-                        </m:ctrlPr>
-                      </m:accPr>
-                      <m:e>
-                        <m:r>
-                          <a:rPr lang="en-US" sz="6600" b="0" i="1" smtClean="0">
-                            <a:solidFill>
-                              <a:schemeClr val="accent1">
-                                <a:lumMod val="50000"/>
-                              </a:schemeClr>
-                            </a:solidFill>
-                            <a:latin typeface="Cambria Math" charset="0"/>
-                          </a:rPr>
-                          <m:t>𝑃</m:t>
-                        </m:r>
-                      </m:e>
-                    </m:acc>
-                  </m:oMath>
-                </a14:m>
-                <a:r>
-                  <a:rPr lang="en-US" sz="6600" dirty="0" smtClean="0">
-                    <a:solidFill>
-                      <a:srgbClr val="000000"/>
-                    </a:solidFill>
-                    <a:latin typeface="Comic Sans MS" pitchFamily="66" charset="0"/>
-                  </a:rPr>
-                  <a:t>, </a:t>
-                </a:r>
-                <a14:m>
-                  <m:oMath xmlns:m="http://schemas.openxmlformats.org/officeDocument/2006/math">
-                    <m:acc>
-                      <m:accPr>
-                        <m:chr m:val="̅"/>
-                        <m:ctrlPr>
-                          <a:rPr lang="en-US" sz="6600" i="1" smtClean="0">
-                            <a:solidFill>
-                              <a:schemeClr val="accent1">
-                                <a:lumMod val="50000"/>
-                              </a:schemeClr>
-                            </a:solidFill>
-                            <a:latin typeface="Cambria Math" charset="0"/>
-                          </a:rPr>
-                        </m:ctrlPr>
-                      </m:accPr>
-                      <m:e>
-                        <m:r>
-                          <a:rPr lang="en-US" sz="6600" b="0" i="1" smtClean="0">
-                            <a:solidFill>
-                              <a:schemeClr val="accent1">
-                                <a:lumMod val="50000"/>
-                              </a:schemeClr>
-                            </a:solidFill>
-                            <a:latin typeface="Cambria Math" charset="0"/>
-                          </a:rPr>
-                          <m:t>𝑄</m:t>
-                        </m:r>
-                      </m:e>
-                    </m:acc>
-                  </m:oMath>
-                </a14:m>
-                <a:r>
-                  <a:rPr lang="en-US" sz="6600" dirty="0" smtClean="0">
-                    <a:solidFill>
-                      <a:srgbClr val="000000"/>
-                    </a:solidFill>
-                    <a:latin typeface="Comic Sans MS" pitchFamily="66" charset="0"/>
-                  </a:rPr>
-                  <a:t>,</a:t>
-                </a:r>
-                <a:r>
-                  <a:rPr lang="is-IS" sz="6600" dirty="0" smtClean="0">
-                    <a:solidFill>
-                      <a:srgbClr val="000000"/>
-                    </a:solidFill>
-                    <a:latin typeface="Comic Sans MS" pitchFamily="66" charset="0"/>
-                  </a:rPr>
-                  <a:t>…</a:t>
-                </a:r>
-                <a:endParaRPr lang="en-US" sz="6600" dirty="0">
-                  <a:solidFill>
-                    <a:srgbClr val="000000"/>
-                  </a:solidFill>
-                  <a:latin typeface="Comic Sans MS" pitchFamily="66" charset="0"/>
-                </a:endParaRPr>
-              </a:p>
-            </p:txBody>
-          </p:sp>
-        </mc:Choice>
-        <mc:Fallback>
-          <p:sp>
-            <p:nvSpPr>
-              <p:cNvPr id="4" name="TextBox 3"/>
-              <p:cNvSpPr txBox="1">
-                <a:spLocks noRot="1" noChangeAspect="1" noMove="1" noResize="1" noEditPoints="1" noAdjustHandles="1" noChangeArrowheads="1" noChangeShapeType="1" noTextEdit="1"/>
-              </p:cNvSpPr>
-              <p:nvPr/>
-            </p:nvSpPr>
-            <p:spPr>
-              <a:xfrm>
-                <a:off x="579864" y="1817647"/>
-                <a:ext cx="7986482" cy="2772234"/>
-              </a:xfrm>
-              <a:prstGeom prst="rect">
-                <a:avLst/>
-              </a:prstGeom>
-              <a:blipFill rotWithShape="0">
-                <a:blip r:embed="rId2"/>
-                <a:stretch>
-                  <a:fillRect l="-5191" t="-6154" r="-3130" b="-16044"/>
-                </a:stretch>
-              </a:blipFill>
-            </p:spPr>
-            <p:txBody>
-              <a:bodyPr/>
-              <a:lstStyle/>
-              <a:p>
-                <a:r>
-                  <a:rPr lang="en-US">
-                    <a:noFill/>
-                  </a:rPr>
-                  <a:t> </a:t>
-                </a:r>
-              </a:p>
-            </p:txBody>
-          </p:sp>
-        </mc:Fallback>
-      </mc:AlternateContent>
-    </p:spTree>
-    <p:extLst>
-      <p:ext uri="{BB962C8B-B14F-4D97-AF65-F5344CB8AC3E}">
-        <p14:creationId xmlns:p14="http://schemas.microsoft.com/office/powerpoint/2010/main" val="361416435"/>
-      </p:ext>
-    </p:extLst>
-  </p:cSld>
-  <p:clrMapOvr>
-    <a:masterClrMapping/>
-  </p:clrMapOvr>
-  <p:transition>
-    <p:fade/>
-  </p:transition>
-  <p:timing>
-    <p:tnLst>
-      <p:par>
-        <p:cTn id="1" dur="indefinite" restart="never" nodeType="tmRoot"/>
-      </p:par>
-    </p:tnLst>
-  </p:timing>
-</p:sld>
-</file>
-
-<file path=ppt/slides/slide20.xml><?xml version="1.0" encoding="utf-8"?>
+<file path=ppt/slides/slide21.xml><?xml version="1.0" encoding="utf-8"?>
 <p:sld xmlns:a="http://schemas.openxmlformats.org/drawingml/2006/main" xmlns:r="http://schemas.openxmlformats.org/officeDocument/2006/relationships" xmlns:p="http://schemas.openxmlformats.org/presentationml/2006/main">
   <p:cSld>
     <p:spTree>
@@ -6072,7 +6142,7 @@
               <a:pPr>
                 <a:defRPr/>
               </a:pPr>
-              <a:t>20</a:t>
+              <a:t>21</a:t>
             </a:fld>
             <a:endParaRPr lang="en-US" dirty="0"/>
           </a:p>
@@ -6088,20 +6158,20 @@
   <p:clrMapOvr>
     <a:masterClrMapping/>
   </p:clrMapOvr>
-  <p:transition spd="slow" advClick="0">
+  <p:transition xmlns:p14="http://schemas.microsoft.com/office/powerpoint/2010/main" spd="slow" advClick="0">
     <p:fade thruBlk="1"/>
   </p:transition>
   <p:timing>
     <p:tnLst>
       <p:par>
-        <p:cTn id="1" dur="indefinite" restart="never" nodeType="tmRoot"/>
+        <p:cTn xmlns:p14="http://schemas.microsoft.com/office/powerpoint/2010/main" id="1" dur="indefinite" restart="never" nodeType="tmRoot"/>
       </p:par>
     </p:tnLst>
   </p:timing>
 </p:sld>
 </file>
 
-<file path=ppt/slides/slide21.xml><?xml version="1.0" encoding="utf-8"?>
+<file path=ppt/slides/slide22.xml><?xml version="1.0" encoding="utf-8"?>
 <p:sld xmlns:a="http://schemas.openxmlformats.org/drawingml/2006/main" xmlns:r="http://schemas.openxmlformats.org/officeDocument/2006/relationships" xmlns:p="http://schemas.openxmlformats.org/presentationml/2006/main" show="0">
   <p:cSld>
     <p:spTree>
@@ -6182,7 +6252,7 @@
               <a:pPr>
                 <a:defRPr/>
               </a:pPr>
-              <a:t>21</a:t>
+              <a:t>22</a:t>
             </a:fld>
             <a:endParaRPr lang="en-US" dirty="0"/>
           </a:p>
@@ -6239,13 +6309,13 @@
   <p:clrMapOvr>
     <a:masterClrMapping/>
   </p:clrMapOvr>
-  <p:transition spd="slow" advClick="0">
+  <p:transition xmlns:p14="http://schemas.microsoft.com/office/powerpoint/2010/main" spd="slow" advClick="0">
     <p:fade thruBlk="1"/>
   </p:transition>
   <p:timing>
     <p:tnLst>
       <p:par>
-        <p:cTn id="1" dur="indefinite" restart="never" nodeType="tmRoot">
+        <p:cTn xmlns:p14="http://schemas.microsoft.com/office/powerpoint/2010/main" id="1" dur="indefinite" restart="never" nodeType="tmRoot">
           <p:childTnLst>
             <p:seq concurrent="1" nextAc="seek">
               <p:cTn id="2" dur="indefinite" nodeType="mainSeq">
@@ -6358,7 +6428,1257 @@
             <p:ph type="title" sz="quarter"/>
           </p:nvPr>
         </p:nvSpPr>
+        <p:spPr>
+          <a:xfrm>
+            <a:off x="1938540" y="296697"/>
+            <a:ext cx="5726489" cy="1262888"/>
+          </a:xfrm>
+        </p:spPr>
+        <p:txBody>
+          <a:bodyPr/>
+          <a:lstStyle/>
+          <a:p>
+            <a:r>
+              <a:rPr lang="en-US" sz="5400" dirty="0" smtClean="0">
+                <a:solidFill>
+                  <a:schemeClr val="accent1">
+                    <a:lumMod val="50000"/>
+                  </a:schemeClr>
+                </a:solidFill>
+              </a:rPr>
+              <a:t>AND</a:t>
+            </a:r>
+            <a:r>
+              <a:rPr lang="en-US" sz="5400" dirty="0" smtClean="0">
+                <a:solidFill>
+                  <a:schemeClr val="tx1"/>
+                </a:solidFill>
+              </a:rPr>
+              <a:t> of </a:t>
+            </a:r>
+            <a:r>
+              <a:rPr lang="en-US" sz="5400" dirty="0">
+                <a:solidFill>
+                  <a:schemeClr val="tx1"/>
+                </a:solidFill>
+              </a:rPr>
+              <a:t>l</a:t>
+            </a:r>
+            <a:r>
+              <a:rPr lang="en-US" sz="5400" dirty="0" smtClean="0">
+                <a:solidFill>
+                  <a:schemeClr val="tx1"/>
+                </a:solidFill>
+              </a:rPr>
+              <a:t>iterals</a:t>
+            </a:r>
+            <a:endParaRPr lang="en-US" sz="5400" dirty="0">
+              <a:solidFill>
+                <a:schemeClr val="tx1"/>
+              </a:solidFill>
+            </a:endParaRPr>
+          </a:p>
+        </p:txBody>
+      </p:sp>
+      <p:sp>
+        <p:nvSpPr>
+          <p:cNvPr id="3" name="Slide Number Placeholder 2"/>
+          <p:cNvSpPr>
+            <a:spLocks noGrp="1"/>
+          </p:cNvSpPr>
+          <p:nvPr>
+            <p:ph type="sldNum" sz="quarter" idx="10"/>
+          </p:nvPr>
+        </p:nvSpPr>
         <p:spPr/>
+        <p:txBody>
+          <a:bodyPr/>
+          <a:lstStyle/>
+          <a:p>
+            <a:pPr>
+              <a:defRPr/>
+            </a:pPr>
+            <a:r>
+              <a:rPr lang="en-US" smtClean="0"/>
+              <a:t>forms.</a:t>
+            </a:r>
+            <a:fld id="{068AF58D-0467-409E-A30A-0D5E3A2B197F}" type="slidenum">
+              <a:rPr lang="en-US" smtClean="0"/>
+              <a:pPr>
+                <a:defRPr/>
+              </a:pPr>
+              <a:t>3</a:t>
+            </a:fld>
+            <a:endParaRPr lang="en-US" dirty="0"/>
+          </a:p>
+        </p:txBody>
+      </p:sp>
+      <p:sp>
+        <p:nvSpPr>
+          <p:cNvPr id="4" name="TextBox 3"/>
+          <p:cNvSpPr txBox="1"/>
+          <p:nvPr/>
+        </p:nvSpPr>
+        <p:spPr>
+          <a:xfrm>
+            <a:off x="708171" y="1688130"/>
+            <a:ext cx="7714958" cy="3785652"/>
+          </a:xfrm>
+          <a:prstGeom prst="rect">
+            <a:avLst/>
+          </a:prstGeom>
+          <a:noFill/>
+        </p:spPr>
+        <p:txBody>
+          <a:bodyPr wrap="square" rtlCol="0">
+            <a:spAutoFit/>
+          </a:bodyPr>
+          <a:lstStyle/>
+          <a:p>
+            <a:pPr lvl="0" algn="l"/>
+            <a:r>
+              <a:rPr lang="en-US" sz="6600" dirty="0" smtClean="0">
+                <a:solidFill>
+                  <a:srgbClr val="0000E5"/>
+                </a:solidFill>
+                <a:latin typeface="Comic Sans MS" pitchFamily="66" charset="0"/>
+              </a:rPr>
+              <a:t>P </a:t>
+            </a:r>
+            <a:r>
+              <a:rPr lang="en-US" sz="5400" dirty="0" smtClean="0">
+                <a:solidFill>
+                  <a:srgbClr val="0000E5"/>
+                </a:solidFill>
+                <a:latin typeface="Comic Sans MS" pitchFamily="66" charset="0"/>
+              </a:rPr>
+              <a:t>AND</a:t>
+            </a:r>
+            <a:r>
+              <a:rPr lang="en-US" sz="6600" dirty="0" smtClean="0">
+                <a:solidFill>
+                  <a:srgbClr val="0000E5"/>
+                </a:solidFill>
+                <a:latin typeface="Comic Sans MS" pitchFamily="66" charset="0"/>
+              </a:rPr>
+              <a:t> Q </a:t>
+            </a:r>
+            <a:r>
+              <a:rPr lang="en-US" sz="5400" dirty="0" smtClean="0">
+                <a:solidFill>
+                  <a:srgbClr val="0000E5"/>
+                </a:solidFill>
+                <a:latin typeface="Comic Sans MS" pitchFamily="66" charset="0"/>
+              </a:rPr>
+              <a:t>AND</a:t>
+            </a:r>
+            <a:r>
+              <a:rPr lang="en-US" sz="6600" dirty="0">
+                <a:solidFill>
+                  <a:srgbClr val="000000"/>
+                </a:solidFill>
+                <a:latin typeface="Comic Sans MS" pitchFamily="66" charset="0"/>
+              </a:rPr>
+              <a:t>    </a:t>
+            </a:r>
+            <a:r>
+              <a:rPr lang="en-US" sz="6600" dirty="0" smtClean="0">
+                <a:solidFill>
+                  <a:srgbClr val="000000"/>
+                </a:solidFill>
+                <a:latin typeface="Comic Sans MS" pitchFamily="66" charset="0"/>
+              </a:rPr>
+              <a:t> </a:t>
+            </a:r>
+            <a:endParaRPr lang="en-US" sz="6600" dirty="0" smtClean="0">
+              <a:solidFill>
+                <a:srgbClr val="0000E5"/>
+              </a:solidFill>
+              <a:latin typeface="Comic Sans MS" pitchFamily="66" charset="0"/>
+            </a:endParaRPr>
+          </a:p>
+          <a:p>
+            <a:pPr lvl="0" algn="l"/>
+            <a:r>
+              <a:rPr lang="en-US" sz="6600" dirty="0" smtClean="0">
+                <a:solidFill>
+                  <a:srgbClr val="0000E5"/>
+                </a:solidFill>
+                <a:latin typeface="Comic Sans MS" pitchFamily="66" charset="0"/>
+              </a:rPr>
+              <a:t>   </a:t>
+            </a:r>
+            <a:r>
+              <a:rPr lang="en-US" sz="5400" dirty="0" smtClean="0">
+                <a:solidFill>
+                  <a:srgbClr val="0000E5"/>
+                </a:solidFill>
+                <a:latin typeface="Comic Sans MS" pitchFamily="66" charset="0"/>
+              </a:rPr>
+              <a:t>∙</a:t>
+            </a:r>
+            <a:r>
+              <a:rPr lang="en-US" sz="5400" dirty="0">
+                <a:solidFill>
+                  <a:srgbClr val="0000E5"/>
+                </a:solidFill>
+                <a:latin typeface="Comic Sans MS" pitchFamily="66" charset="0"/>
+              </a:rPr>
+              <a:t>∙</a:t>
+            </a:r>
+            <a:r>
+              <a:rPr lang="en-US" sz="5400" dirty="0" smtClean="0">
+                <a:solidFill>
+                  <a:srgbClr val="0000E5"/>
+                </a:solidFill>
+                <a:latin typeface="Comic Sans MS" pitchFamily="66" charset="0"/>
+              </a:rPr>
+              <a:t>∙ AND</a:t>
+            </a:r>
+            <a:r>
+              <a:rPr lang="en-US" sz="6600" dirty="0" smtClean="0">
+                <a:solidFill>
+                  <a:srgbClr val="0000E5"/>
+                </a:solidFill>
+                <a:latin typeface="Comic Sans MS" pitchFamily="66" charset="0"/>
+              </a:rPr>
+              <a:t> S </a:t>
+            </a:r>
+            <a:r>
+              <a:rPr lang="en-US" sz="5400" dirty="0" smtClean="0">
+                <a:solidFill>
+                  <a:srgbClr val="0000E5"/>
+                </a:solidFill>
+                <a:latin typeface="Comic Sans MS" pitchFamily="66" charset="0"/>
+              </a:rPr>
+              <a:t>AND</a:t>
+            </a:r>
+            <a:r>
+              <a:rPr lang="en-US" sz="6600" dirty="0" smtClean="0">
+                <a:solidFill>
+                  <a:srgbClr val="0000E5"/>
+                </a:solidFill>
+                <a:latin typeface="Comic Sans MS" pitchFamily="66" charset="0"/>
+              </a:rPr>
+              <a:t> </a:t>
+            </a:r>
+          </a:p>
+          <a:p>
+            <a:pPr algn="l"/>
+            <a:endParaRPr lang="en-US" sz="5400" dirty="0" smtClean="0">
+              <a:latin typeface="Comic Sans MS" pitchFamily="66" charset="0"/>
+            </a:endParaRPr>
+          </a:p>
+          <a:p>
+            <a:pPr algn="l"/>
+            <a:r>
+              <a:rPr lang="en-US" sz="5400" dirty="0" smtClean="0">
+                <a:latin typeface="Comic Sans MS" pitchFamily="66" charset="0"/>
+              </a:rPr>
+              <a:t>Likewise</a:t>
+            </a:r>
+            <a:r>
+              <a:rPr lang="en-US" sz="5400" dirty="0" smtClean="0">
+                <a:solidFill>
+                  <a:srgbClr val="0000E5"/>
+                </a:solidFill>
+                <a:latin typeface="Comic Sans MS" pitchFamily="66" charset="0"/>
+              </a:rPr>
+              <a:t> </a:t>
+            </a:r>
+            <a:r>
+              <a:rPr lang="en-US" sz="5400" b="1" kern="0" dirty="0" smtClean="0">
+                <a:solidFill>
+                  <a:srgbClr val="CCCCFF">
+                    <a:lumMod val="50000"/>
+                  </a:srgbClr>
+                </a:solidFill>
+                <a:latin typeface="Comic Sans MS" pitchFamily="66" charset="0"/>
+                <a:ea typeface="+mj-ea"/>
+                <a:cs typeface="+mj-cs"/>
+              </a:rPr>
+              <a:t>OR</a:t>
+            </a:r>
+            <a:r>
+              <a:rPr lang="en-US" sz="5400" b="1" kern="0" dirty="0" smtClean="0">
+                <a:solidFill>
+                  <a:srgbClr val="000000"/>
+                </a:solidFill>
+                <a:latin typeface="Comic Sans MS" pitchFamily="66" charset="0"/>
+                <a:ea typeface="+mj-ea"/>
+                <a:cs typeface="+mj-cs"/>
+              </a:rPr>
+              <a:t> </a:t>
+            </a:r>
+            <a:r>
+              <a:rPr lang="en-US" sz="5400" b="1" kern="0" dirty="0">
+                <a:solidFill>
+                  <a:srgbClr val="000000"/>
+                </a:solidFill>
+                <a:latin typeface="Comic Sans MS" pitchFamily="66" charset="0"/>
+                <a:ea typeface="+mj-ea"/>
+                <a:cs typeface="+mj-cs"/>
+              </a:rPr>
+              <a:t>of literals</a:t>
+            </a:r>
+            <a:endParaRPr lang="en-US" sz="5400" dirty="0">
+              <a:solidFill>
+                <a:srgbClr val="0000E5"/>
+              </a:solidFill>
+              <a:latin typeface="Comic Sans MS" pitchFamily="66" charset="0"/>
+            </a:endParaRPr>
+          </a:p>
+        </p:txBody>
+      </p:sp>
+      <p:graphicFrame>
+        <p:nvGraphicFramePr>
+          <p:cNvPr id="5" name="Object 4"/>
+          <p:cNvGraphicFramePr>
+            <a:graphicFrameLocks noChangeAspect="1"/>
+          </p:cNvGraphicFramePr>
+          <p:nvPr>
+            <p:extLst>
+              <p:ext uri="{D42A27DB-BD31-4B8C-83A1-F6EECF244321}">
+                <p14:modId xmlns:p14="http://schemas.microsoft.com/office/powerpoint/2010/main" val="322404406"/>
+              </p:ext>
+            </p:extLst>
+          </p:nvPr>
+        </p:nvGraphicFramePr>
+        <p:xfrm>
+          <a:off x="5795593" y="1632822"/>
+          <a:ext cx="1017588" cy="1452563"/>
+        </p:xfrm>
+        <a:graphic>
+          <a:graphicData uri="http://schemas.openxmlformats.org/presentationml/2006/ole">
+            <mc:AlternateContent xmlns:mc="http://schemas.openxmlformats.org/markup-compatibility/2006">
+              <mc:Choice xmlns:v="urn:schemas-microsoft-com:vml" Requires="v">
+                <p:oleObj spid="_x0000_s23559" name="Equation" r:id="rId3" imgW="177800" imgH="254000" progId="Equation.DSMT4">
+                  <p:embed/>
+                </p:oleObj>
+              </mc:Choice>
+              <mc:Fallback>
+                <p:oleObj name="Equation" r:id="rId3" imgW="177800" imgH="254000" progId="Equation.DSMT4">
+                  <p:embed/>
+                  <p:pic>
+                    <p:nvPicPr>
+                      <p:cNvPr id="0" name=""/>
+                      <p:cNvPicPr/>
+                      <p:nvPr/>
+                    </p:nvPicPr>
+                    <p:blipFill>
+                      <a:blip r:embed="rId4"/>
+                      <a:stretch>
+                        <a:fillRect/>
+                      </a:stretch>
+                    </p:blipFill>
+                    <p:spPr>
+                      <a:xfrm>
+                        <a:off x="5795593" y="1632822"/>
+                        <a:ext cx="1017588" cy="1452563"/>
+                      </a:xfrm>
+                      <a:prstGeom prst="rect">
+                        <a:avLst/>
+                      </a:prstGeom>
+                    </p:spPr>
+                  </p:pic>
+                </p:oleObj>
+              </mc:Fallback>
+            </mc:AlternateContent>
+          </a:graphicData>
+        </a:graphic>
+      </p:graphicFrame>
+      <p:graphicFrame>
+        <p:nvGraphicFramePr>
+          <p:cNvPr id="6" name="Object 5"/>
+          <p:cNvGraphicFramePr>
+            <a:graphicFrameLocks noChangeAspect="1"/>
+          </p:cNvGraphicFramePr>
+          <p:nvPr>
+            <p:extLst>
+              <p:ext uri="{D42A27DB-BD31-4B8C-83A1-F6EECF244321}">
+                <p14:modId xmlns:p14="http://schemas.microsoft.com/office/powerpoint/2010/main" val="230675306"/>
+              </p:ext>
+            </p:extLst>
+          </p:nvPr>
+        </p:nvGraphicFramePr>
+        <p:xfrm>
+          <a:off x="6349069" y="2615187"/>
+          <a:ext cx="1017588" cy="1452563"/>
+        </p:xfrm>
+        <a:graphic>
+          <a:graphicData uri="http://schemas.openxmlformats.org/presentationml/2006/ole">
+            <mc:AlternateContent xmlns:mc="http://schemas.openxmlformats.org/markup-compatibility/2006">
+              <mc:Choice xmlns:v="urn:schemas-microsoft-com:vml" Requires="v">
+                <p:oleObj spid="_x0000_s23560" name="Equation" r:id="rId5" imgW="177800" imgH="254000" progId="Equation.DSMT4">
+                  <p:embed/>
+                </p:oleObj>
+              </mc:Choice>
+              <mc:Fallback>
+                <p:oleObj name="Equation" r:id="rId5" imgW="177800" imgH="254000" progId="Equation.DSMT4">
+                  <p:embed/>
+                  <p:pic>
+                    <p:nvPicPr>
+                      <p:cNvPr id="0" name=""/>
+                      <p:cNvPicPr/>
+                      <p:nvPr/>
+                    </p:nvPicPr>
+                    <p:blipFill>
+                      <a:blip r:embed="rId6"/>
+                      <a:stretch>
+                        <a:fillRect/>
+                      </a:stretch>
+                    </p:blipFill>
+                    <p:spPr>
+                      <a:xfrm>
+                        <a:off x="6349069" y="2615187"/>
+                        <a:ext cx="1017588" cy="1452563"/>
+                      </a:xfrm>
+                      <a:prstGeom prst="rect">
+                        <a:avLst/>
+                      </a:prstGeom>
+                    </p:spPr>
+                  </p:pic>
+                </p:oleObj>
+              </mc:Fallback>
+            </mc:AlternateContent>
+          </a:graphicData>
+        </a:graphic>
+      </p:graphicFrame>
+    </p:spTree>
+    <p:extLst>
+      <p:ext uri="{BB962C8B-B14F-4D97-AF65-F5344CB8AC3E}">
+        <p14:creationId xmlns:p14="http://schemas.microsoft.com/office/powerpoint/2010/main" val="346776993"/>
+      </p:ext>
+    </p:extLst>
+  </p:cSld>
+  <p:clrMapOvr>
+    <a:masterClrMapping/>
+  </p:clrMapOvr>
+  <p:transition xmlns:p14="http://schemas.microsoft.com/office/powerpoint/2010/main">
+    <p:fade/>
+  </p:transition>
+  <p:timing>
+    <p:tnLst>
+      <p:par>
+        <p:cTn xmlns:p14="http://schemas.microsoft.com/office/powerpoint/2010/main" id="1" dur="indefinite" restart="never" nodeType="tmRoot"/>
+      </p:par>
+    </p:tnLst>
+  </p:timing>
+</p:sld>
+</file>
+
+<file path=ppt/slides/slide4.xml><?xml version="1.0" encoding="utf-8"?>
+<p:sld xmlns:a="http://schemas.openxmlformats.org/drawingml/2006/main" xmlns:r="http://schemas.openxmlformats.org/officeDocument/2006/relationships" xmlns:p="http://schemas.openxmlformats.org/presentationml/2006/main">
+  <p:cSld>
+    <p:spTree>
+      <p:nvGrpSpPr>
+        <p:cNvPr id="1" name=""/>
+        <p:cNvGrpSpPr/>
+        <p:nvPr/>
+      </p:nvGrpSpPr>
+      <p:grpSpPr>
+        <a:xfrm>
+          <a:off x="0" y="0"/>
+          <a:ext cx="0" cy="0"/>
+          <a:chOff x="0" y="0"/>
+          <a:chExt cx="0" cy="0"/>
+        </a:xfrm>
+      </p:grpSpPr>
+      <p:sp>
+        <p:nvSpPr>
+          <p:cNvPr id="3" name="Slide Number Placeholder 2"/>
+          <p:cNvSpPr>
+            <a:spLocks noGrp="1"/>
+          </p:cNvSpPr>
+          <p:nvPr>
+            <p:ph type="sldNum" sz="quarter" idx="10"/>
+          </p:nvPr>
+        </p:nvSpPr>
+        <p:spPr/>
+        <p:txBody>
+          <a:bodyPr/>
+          <a:lstStyle/>
+          <a:p>
+            <a:pPr>
+              <a:defRPr/>
+            </a:pPr>
+            <a:r>
+              <a:rPr lang="en-US" smtClean="0"/>
+              <a:t>forms.</a:t>
+            </a:r>
+            <a:fld id="{068AF58D-0467-409E-A30A-0D5E3A2B197F}" type="slidenum">
+              <a:rPr lang="en-US" smtClean="0"/>
+              <a:pPr>
+                <a:defRPr/>
+              </a:pPr>
+              <a:t>4</a:t>
+            </a:fld>
+            <a:endParaRPr lang="en-US" dirty="0"/>
+          </a:p>
+        </p:txBody>
+      </p:sp>
+      <p:sp>
+        <p:nvSpPr>
+          <p:cNvPr id="6" name="TextBox 5"/>
+          <p:cNvSpPr txBox="1"/>
+          <p:nvPr/>
+        </p:nvSpPr>
+        <p:spPr>
+          <a:xfrm>
+            <a:off x="1247796" y="236403"/>
+            <a:ext cx="7676170" cy="830997"/>
+          </a:xfrm>
+          <a:prstGeom prst="rect">
+            <a:avLst/>
+          </a:prstGeom>
+          <a:noFill/>
+        </p:spPr>
+        <p:txBody>
+          <a:bodyPr wrap="square" rtlCol="0">
+            <a:spAutoFit/>
+          </a:bodyPr>
+          <a:lstStyle/>
+          <a:p>
+            <a:r>
+              <a:rPr lang="en-US" sz="4800" dirty="0" smtClean="0">
+                <a:solidFill>
+                  <a:srgbClr val="BB0FAB"/>
+                </a:solidFill>
+                <a:latin typeface="Comic Sans MS" pitchFamily="66" charset="0"/>
+              </a:rPr>
+              <a:t>Disjunctive</a:t>
+            </a:r>
+            <a:r>
+              <a:rPr lang="en-US" sz="4800" dirty="0" smtClean="0">
+                <a:solidFill>
+                  <a:srgbClr val="000000"/>
+                </a:solidFill>
+                <a:latin typeface="Comic Sans MS" pitchFamily="66" charset="0"/>
+              </a:rPr>
+              <a:t> </a:t>
+            </a:r>
+            <a:r>
+              <a:rPr lang="en-US" sz="4800" dirty="0" smtClean="0">
+                <a:solidFill>
+                  <a:srgbClr val="BB0FAB"/>
+                </a:solidFill>
+                <a:latin typeface="Comic Sans MS" pitchFamily="66" charset="0"/>
+              </a:rPr>
+              <a:t>Normal </a:t>
+            </a:r>
+            <a:r>
+              <a:rPr lang="en-US" sz="4800" dirty="0" smtClean="0">
+                <a:solidFill>
+                  <a:srgbClr val="BB0FAB"/>
+                </a:solidFill>
+                <a:latin typeface="Comic Sans MS" pitchFamily="66" charset="0"/>
+              </a:rPr>
+              <a:t>Form</a:t>
+            </a:r>
+            <a:endParaRPr lang="en-US" sz="4800" dirty="0" smtClean="0">
+              <a:solidFill>
+                <a:srgbClr val="BB0FAB"/>
+              </a:solidFill>
+              <a:latin typeface="Comic Sans MS" pitchFamily="66" charset="0"/>
+            </a:endParaRPr>
+          </a:p>
+        </p:txBody>
+      </p:sp>
+      <p:sp>
+        <p:nvSpPr>
+          <p:cNvPr id="5" name="Rectangle 4"/>
+          <p:cNvSpPr/>
+          <p:nvPr/>
+        </p:nvSpPr>
+        <p:spPr>
+          <a:xfrm>
+            <a:off x="3483769" y="1198269"/>
+            <a:ext cx="2163761" cy="923330"/>
+          </a:xfrm>
+          <a:prstGeom prst="rect">
+            <a:avLst/>
+          </a:prstGeom>
+        </p:spPr>
+        <p:txBody>
+          <a:bodyPr wrap="none">
+            <a:spAutoFit/>
+          </a:bodyPr>
+          <a:lstStyle/>
+          <a:p>
+            <a:r>
+              <a:rPr lang="en-US" sz="5400" dirty="0">
+                <a:solidFill>
+                  <a:srgbClr val="000000"/>
+                </a:solidFill>
+                <a:latin typeface="Comic Sans MS" pitchFamily="66" charset="0"/>
+              </a:rPr>
+              <a:t>(</a:t>
+            </a:r>
+            <a:r>
+              <a:rPr lang="en-US" sz="5400" dirty="0">
+                <a:solidFill>
+                  <a:srgbClr val="BB0FAB"/>
+                </a:solidFill>
+                <a:latin typeface="Comic Sans MS" pitchFamily="66" charset="0"/>
+              </a:rPr>
+              <a:t>DNF</a:t>
+            </a:r>
+            <a:r>
+              <a:rPr lang="en-US" sz="5400" dirty="0">
+                <a:solidFill>
+                  <a:srgbClr val="000000"/>
+                </a:solidFill>
+                <a:latin typeface="Comic Sans MS" pitchFamily="66" charset="0"/>
+              </a:rPr>
+              <a:t>)</a:t>
+            </a:r>
+          </a:p>
+        </p:txBody>
+      </p:sp>
+      <p:sp>
+        <p:nvSpPr>
+          <p:cNvPr id="8" name="TextBox 7"/>
+          <p:cNvSpPr txBox="1"/>
+          <p:nvPr/>
+        </p:nvSpPr>
+        <p:spPr>
+          <a:xfrm>
+            <a:off x="949121" y="2273320"/>
+            <a:ext cx="7233057" cy="923330"/>
+          </a:xfrm>
+          <a:prstGeom prst="rect">
+            <a:avLst/>
+          </a:prstGeom>
+          <a:noFill/>
+        </p:spPr>
+        <p:txBody>
+          <a:bodyPr wrap="none" rtlCol="0">
+            <a:spAutoFit/>
+          </a:bodyPr>
+          <a:lstStyle/>
+          <a:p>
+            <a:pPr algn="l"/>
+            <a:r>
+              <a:rPr lang="en-US" sz="4400" dirty="0" smtClean="0">
+                <a:solidFill>
+                  <a:srgbClr val="0000E5"/>
+                </a:solidFill>
+                <a:latin typeface="Comic Sans MS" pitchFamily="66" charset="0"/>
+              </a:rPr>
+              <a:t>OR</a:t>
+            </a:r>
+            <a:r>
+              <a:rPr lang="en-US" sz="5400" dirty="0" smtClean="0">
+                <a:latin typeface="Comic Sans MS" pitchFamily="66" charset="0"/>
+              </a:rPr>
+              <a:t> </a:t>
+            </a:r>
+            <a:r>
+              <a:rPr lang="en-US" sz="5400" dirty="0">
+                <a:latin typeface="Comic Sans MS" pitchFamily="66" charset="0"/>
+              </a:rPr>
+              <a:t>of </a:t>
+            </a:r>
+            <a:r>
+              <a:rPr lang="en-US" sz="4400" dirty="0" smtClean="0">
+                <a:solidFill>
+                  <a:schemeClr val="accent1">
+                    <a:lumMod val="50000"/>
+                  </a:schemeClr>
+                </a:solidFill>
+                <a:latin typeface="Comic Sans MS" pitchFamily="66" charset="0"/>
+              </a:rPr>
+              <a:t>AND</a:t>
+            </a:r>
+            <a:r>
+              <a:rPr lang="en-US" sz="5400" dirty="0" smtClean="0">
+                <a:latin typeface="Comic Sans MS" pitchFamily="66" charset="0"/>
+              </a:rPr>
+              <a:t>s of literals</a:t>
+            </a:r>
+            <a:endParaRPr lang="en-US" sz="5400" dirty="0" smtClean="0">
+              <a:latin typeface="Comic Sans MS" pitchFamily="66" charset="0"/>
+            </a:endParaRPr>
+          </a:p>
+        </p:txBody>
+      </p:sp>
+      <p:graphicFrame>
+        <p:nvGraphicFramePr>
+          <p:cNvPr id="9" name="Object 8"/>
+          <p:cNvGraphicFramePr>
+            <a:graphicFrameLocks noChangeAspect="1"/>
+          </p:cNvGraphicFramePr>
+          <p:nvPr>
+            <p:extLst>
+              <p:ext uri="{D42A27DB-BD31-4B8C-83A1-F6EECF244321}">
+                <p14:modId xmlns:p14="http://schemas.microsoft.com/office/powerpoint/2010/main" val="1842854931"/>
+              </p:ext>
+            </p:extLst>
+          </p:nvPr>
+        </p:nvGraphicFramePr>
+        <p:xfrm>
+          <a:off x="782637" y="3430588"/>
+          <a:ext cx="7566025" cy="2097087"/>
+        </p:xfrm>
+        <a:graphic>
+          <a:graphicData uri="http://schemas.openxmlformats.org/presentationml/2006/ole">
+            <mc:AlternateContent xmlns:mc="http://schemas.openxmlformats.org/markup-compatibility/2006">
+              <mc:Choice xmlns:v="urn:schemas-microsoft-com:vml" Requires="v">
+                <p:oleObj spid="_x0000_s24579" name="Equation" r:id="rId3" imgW="1739900" imgH="482600" progId="Equation.DSMT4">
+                  <p:embed/>
+                </p:oleObj>
+              </mc:Choice>
+              <mc:Fallback>
+                <p:oleObj name="Equation" r:id="rId3" imgW="1739900" imgH="482600" progId="Equation.DSMT4">
+                  <p:embed/>
+                  <p:pic>
+                    <p:nvPicPr>
+                      <p:cNvPr id="0" name=""/>
+                      <p:cNvPicPr/>
+                      <p:nvPr/>
+                    </p:nvPicPr>
+                    <p:blipFill>
+                      <a:blip r:embed="rId4"/>
+                      <a:stretch>
+                        <a:fillRect/>
+                      </a:stretch>
+                    </p:blipFill>
+                    <p:spPr>
+                      <a:xfrm>
+                        <a:off x="782637" y="3430588"/>
+                        <a:ext cx="7566025" cy="2097087"/>
+                      </a:xfrm>
+                      <a:prstGeom prst="rect">
+                        <a:avLst/>
+                      </a:prstGeom>
+                    </p:spPr>
+                  </p:pic>
+                </p:oleObj>
+              </mc:Fallback>
+            </mc:AlternateContent>
+          </a:graphicData>
+        </a:graphic>
+      </p:graphicFrame>
+      <p:sp>
+        <p:nvSpPr>
+          <p:cNvPr id="10" name="Oval 9"/>
+          <p:cNvSpPr/>
+          <p:nvPr/>
+        </p:nvSpPr>
+        <p:spPr bwMode="auto">
+          <a:xfrm>
+            <a:off x="6918580" y="4545079"/>
+            <a:ext cx="946987" cy="946891"/>
+          </a:xfrm>
+          <a:prstGeom prst="ellipse">
+            <a:avLst/>
+          </a:prstGeom>
+          <a:noFill/>
+          <a:ln w="38100" cap="flat" cmpd="sng" algn="ctr">
+            <a:solidFill>
+              <a:srgbClr val="FA4231"/>
+            </a:solidFill>
+            <a:prstDash val="solid"/>
+            <a:round/>
+            <a:headEnd type="none" w="med" len="med"/>
+            <a:tailEnd type="none" w="med" len="med"/>
+          </a:ln>
+          <a:effectLst/>
+        </p:spPr>
+        <p:txBody>
+          <a:bodyPr vert="horz" wrap="none" lIns="91440" tIns="45720" rIns="91440" bIns="45720" numCol="1" rtlCol="0" anchor="ctr" anchorCtr="0" compatLnSpc="1">
+            <a:prstTxWarp prst="textNoShape">
+              <a:avLst/>
+            </a:prstTxWarp>
+          </a:bodyPr>
+          <a:lstStyle/>
+          <a:p>
+            <a:pPr marL="0" marR="0" indent="0" algn="ctr" defTabSz="914400" rtl="0" eaLnBrk="1" fontAlgn="base" latinLnBrk="0" hangingPunct="1">
+              <a:lnSpc>
+                <a:spcPct val="100000"/>
+              </a:lnSpc>
+              <a:spcBef>
+                <a:spcPct val="0"/>
+              </a:spcBef>
+              <a:spcAft>
+                <a:spcPct val="0"/>
+              </a:spcAft>
+              <a:buClrTx/>
+              <a:buSzTx/>
+              <a:buFontTx/>
+              <a:buNone/>
+              <a:tabLst/>
+            </a:pPr>
+            <a:endParaRPr kumimoji="0" lang="en-US" sz="3200" b="0" i="0" u="none" strike="noStrike" cap="none" normalizeH="0" baseline="0" smtClean="0">
+              <a:ln>
+                <a:noFill/>
+              </a:ln>
+              <a:solidFill>
+                <a:schemeClr val="tx1"/>
+              </a:solidFill>
+              <a:effectLst/>
+              <a:latin typeface="Times New Roman" pitchFamily="18" charset="0"/>
+            </a:endParaRPr>
+          </a:p>
+        </p:txBody>
+      </p:sp>
+      <p:sp>
+        <p:nvSpPr>
+          <p:cNvPr id="11" name="TextBox 10"/>
+          <p:cNvSpPr txBox="1"/>
+          <p:nvPr/>
+        </p:nvSpPr>
+        <p:spPr>
+          <a:xfrm>
+            <a:off x="405350" y="5592230"/>
+            <a:ext cx="8387445" cy="923330"/>
+          </a:xfrm>
+          <a:prstGeom prst="rect">
+            <a:avLst/>
+          </a:prstGeom>
+          <a:noFill/>
+          <a:ln w="38100">
+            <a:solidFill>
+              <a:srgbClr val="CE483F"/>
+            </a:solidFill>
+          </a:ln>
+        </p:spPr>
+        <p:txBody>
+          <a:bodyPr wrap="none" rtlCol="0">
+            <a:spAutoFit/>
+          </a:bodyPr>
+          <a:lstStyle/>
+          <a:p>
+            <a:pPr algn="l"/>
+            <a:r>
+              <a:rPr lang="en-US" sz="5400" dirty="0" smtClean="0">
+                <a:latin typeface="Comic Sans MS" pitchFamily="66" charset="0"/>
+              </a:rPr>
+              <a:t>counts as </a:t>
+            </a:r>
+            <a:r>
+              <a:rPr lang="en-US" sz="4400" dirty="0" smtClean="0">
+                <a:solidFill>
+                  <a:srgbClr val="0000E5"/>
+                </a:solidFill>
+                <a:latin typeface="Comic Sans MS" pitchFamily="66" charset="0"/>
+              </a:rPr>
+              <a:t>AND</a:t>
+            </a:r>
+            <a:r>
+              <a:rPr lang="en-US" sz="5400" dirty="0" smtClean="0">
+                <a:latin typeface="Comic Sans MS" pitchFamily="66" charset="0"/>
+              </a:rPr>
+              <a:t> of literals</a:t>
+            </a:r>
+            <a:endParaRPr lang="en-US" sz="5400" dirty="0" smtClean="0">
+              <a:latin typeface="Comic Sans MS" pitchFamily="66" charset="0"/>
+            </a:endParaRPr>
+          </a:p>
+        </p:txBody>
+      </p:sp>
+    </p:spTree>
+    <p:extLst>
+      <p:ext uri="{BB962C8B-B14F-4D97-AF65-F5344CB8AC3E}">
+        <p14:creationId xmlns:p14="http://schemas.microsoft.com/office/powerpoint/2010/main" val="34003220"/>
+      </p:ext>
+    </p:extLst>
+  </p:cSld>
+  <p:clrMapOvr>
+    <a:masterClrMapping/>
+  </p:clrMapOvr>
+  <p:transition xmlns:p14="http://schemas.microsoft.com/office/powerpoint/2010/main" spd="slow" advClick="0">
+    <p:fade thruBlk="1"/>
+  </p:transition>
+  <p:timing>
+    <p:tnLst>
+      <p:par>
+        <p:cTn xmlns:p14="http://schemas.microsoft.com/office/powerpoint/2010/main" id="1" dur="indefinite" restart="never" nodeType="tmRoot">
+          <p:childTnLst>
+            <p:seq concurrent="1" nextAc="seek">
+              <p:cTn id="2" dur="indefinite" nodeType="mainSeq">
+                <p:childTnLst>
+                  <p:par>
+                    <p:cTn id="3" fill="hold">
+                      <p:stCondLst>
+                        <p:cond delay="indefinite"/>
+                      </p:stCondLst>
+                      <p:childTnLst>
+                        <p:par>
+                          <p:cTn id="4" fill="hold">
+                            <p:stCondLst>
+                              <p:cond delay="0"/>
+                            </p:stCondLst>
+                            <p:childTnLst>
+                              <p:par>
+                                <p:cTn id="5" presetID="10" presetClass="entr" presetSubtype="0" fill="hold" nodeType="clickEffect">
+                                  <p:stCondLst>
+                                    <p:cond delay="0"/>
+                                  </p:stCondLst>
+                                  <p:childTnLst>
+                                    <p:set>
+                                      <p:cBhvr>
+                                        <p:cTn id="6" dur="1" fill="hold">
+                                          <p:stCondLst>
+                                            <p:cond delay="0"/>
+                                          </p:stCondLst>
+                                        </p:cTn>
+                                        <p:tgtEl>
+                                          <p:spTgt spid="5">
+                                            <p:txEl>
+                                              <p:pRg st="0" end="0"/>
+                                            </p:txEl>
+                                          </p:spTgt>
+                                        </p:tgtEl>
+                                        <p:attrNameLst>
+                                          <p:attrName>style.visibility</p:attrName>
+                                        </p:attrNameLst>
+                                      </p:cBhvr>
+                                      <p:to>
+                                        <p:strVal val="visible"/>
+                                      </p:to>
+                                    </p:set>
+                                    <p:animEffect transition="in" filter="fade">
+                                      <p:cBhvr>
+                                        <p:cTn id="7" dur="500"/>
+                                        <p:tgtEl>
+                                          <p:spTgt spid="5">
+                                            <p:txEl>
+                                              <p:pRg st="0" end="0"/>
+                                            </p:txEl>
+                                          </p:spTgt>
+                                        </p:tgtEl>
+                                      </p:cBhvr>
+                                    </p:animEffect>
+                                  </p:childTnLst>
+                                </p:cTn>
+                              </p:par>
+                            </p:childTnLst>
+                          </p:cTn>
+                        </p:par>
+                      </p:childTnLst>
+                    </p:cTn>
+                  </p:par>
+                  <p:par>
+                    <p:cTn id="8" fill="hold">
+                      <p:stCondLst>
+                        <p:cond delay="indefinite"/>
+                      </p:stCondLst>
+                      <p:childTnLst>
+                        <p:par>
+                          <p:cTn id="9" fill="hold">
+                            <p:stCondLst>
+                              <p:cond delay="0"/>
+                            </p:stCondLst>
+                            <p:childTnLst>
+                              <p:par>
+                                <p:cTn id="10" presetID="10" presetClass="entr" presetSubtype="0" fill="hold" nodeType="clickEffect">
+                                  <p:stCondLst>
+                                    <p:cond delay="0"/>
+                                  </p:stCondLst>
+                                  <p:childTnLst>
+                                    <p:set>
+                                      <p:cBhvr>
+                                        <p:cTn id="11" dur="1" fill="hold">
+                                          <p:stCondLst>
+                                            <p:cond delay="0"/>
+                                          </p:stCondLst>
+                                        </p:cTn>
+                                        <p:tgtEl>
+                                          <p:spTgt spid="8">
+                                            <p:txEl>
+                                              <p:pRg st="0" end="0"/>
+                                            </p:txEl>
+                                          </p:spTgt>
+                                        </p:tgtEl>
+                                        <p:attrNameLst>
+                                          <p:attrName>style.visibility</p:attrName>
+                                        </p:attrNameLst>
+                                      </p:cBhvr>
+                                      <p:to>
+                                        <p:strVal val="visible"/>
+                                      </p:to>
+                                    </p:set>
+                                    <p:animEffect transition="in" filter="fade">
+                                      <p:cBhvr>
+                                        <p:cTn id="12" dur="500"/>
+                                        <p:tgtEl>
+                                          <p:spTgt spid="8">
+                                            <p:txEl>
+                                              <p:pRg st="0" end="0"/>
+                                            </p:txEl>
+                                          </p:spTgt>
+                                        </p:tgtEl>
+                                      </p:cBhvr>
+                                    </p:animEffect>
+                                  </p:childTnLst>
+                                </p:cTn>
+                              </p:par>
+                            </p:childTnLst>
+                          </p:cTn>
+                        </p:par>
+                      </p:childTnLst>
+                    </p:cTn>
+                  </p:par>
+                  <p:par>
+                    <p:cTn id="13" fill="hold">
+                      <p:stCondLst>
+                        <p:cond delay="indefinite"/>
+                      </p:stCondLst>
+                      <p:childTnLst>
+                        <p:par>
+                          <p:cTn id="14" fill="hold">
+                            <p:stCondLst>
+                              <p:cond delay="0"/>
+                            </p:stCondLst>
+                            <p:childTnLst>
+                              <p:par>
+                                <p:cTn id="15" presetID="22" presetClass="entr" presetSubtype="1" fill="hold" nodeType="clickEffect">
+                                  <p:stCondLst>
+                                    <p:cond delay="0"/>
+                                  </p:stCondLst>
+                                  <p:childTnLst>
+                                    <p:set>
+                                      <p:cBhvr>
+                                        <p:cTn id="16" dur="1" fill="hold">
+                                          <p:stCondLst>
+                                            <p:cond delay="0"/>
+                                          </p:stCondLst>
+                                        </p:cTn>
+                                        <p:tgtEl>
+                                          <p:spTgt spid="9"/>
+                                        </p:tgtEl>
+                                        <p:attrNameLst>
+                                          <p:attrName>style.visibility</p:attrName>
+                                        </p:attrNameLst>
+                                      </p:cBhvr>
+                                      <p:to>
+                                        <p:strVal val="visible"/>
+                                      </p:to>
+                                    </p:set>
+                                    <p:animEffect transition="in" filter="wipe(up)">
+                                      <p:cBhvr>
+                                        <p:cTn id="17" dur="2000"/>
+                                        <p:tgtEl>
+                                          <p:spTgt spid="9"/>
+                                        </p:tgtEl>
+                                      </p:cBhvr>
+                                    </p:animEffect>
+                                  </p:childTnLst>
+                                </p:cTn>
+                              </p:par>
+                            </p:childTnLst>
+                          </p:cTn>
+                        </p:par>
+                      </p:childTnLst>
+                    </p:cTn>
+                  </p:par>
+                  <p:par>
+                    <p:cTn id="18" fill="hold">
+                      <p:stCondLst>
+                        <p:cond delay="indefinite"/>
+                      </p:stCondLst>
+                      <p:childTnLst>
+                        <p:par>
+                          <p:cTn id="19" fill="hold">
+                            <p:stCondLst>
+                              <p:cond delay="0"/>
+                            </p:stCondLst>
+                            <p:childTnLst>
+                              <p:par>
+                                <p:cTn id="20" presetID="2" presetClass="entr" presetSubtype="3" fill="hold" grpId="0" nodeType="clickEffect">
+                                  <p:stCondLst>
+                                    <p:cond delay="0"/>
+                                  </p:stCondLst>
+                                  <p:childTnLst>
+                                    <p:set>
+                                      <p:cBhvr>
+                                        <p:cTn id="21" dur="1" fill="hold">
+                                          <p:stCondLst>
+                                            <p:cond delay="0"/>
+                                          </p:stCondLst>
+                                        </p:cTn>
+                                        <p:tgtEl>
+                                          <p:spTgt spid="10"/>
+                                        </p:tgtEl>
+                                        <p:attrNameLst>
+                                          <p:attrName>style.visibility</p:attrName>
+                                        </p:attrNameLst>
+                                      </p:cBhvr>
+                                      <p:to>
+                                        <p:strVal val="visible"/>
+                                      </p:to>
+                                    </p:set>
+                                    <p:anim calcmode="lin" valueType="num">
+                                      <p:cBhvr additive="base">
+                                        <p:cTn id="22" dur="500" fill="hold"/>
+                                        <p:tgtEl>
+                                          <p:spTgt spid="10"/>
+                                        </p:tgtEl>
+                                        <p:attrNameLst>
+                                          <p:attrName>ppt_x</p:attrName>
+                                        </p:attrNameLst>
+                                      </p:cBhvr>
+                                      <p:tavLst>
+                                        <p:tav tm="0">
+                                          <p:val>
+                                            <p:strVal val="1+#ppt_w/2"/>
+                                          </p:val>
+                                        </p:tav>
+                                        <p:tav tm="100000">
+                                          <p:val>
+                                            <p:strVal val="#ppt_x"/>
+                                          </p:val>
+                                        </p:tav>
+                                      </p:tavLst>
+                                    </p:anim>
+                                    <p:anim calcmode="lin" valueType="num">
+                                      <p:cBhvr additive="base">
+                                        <p:cTn id="23" dur="500" fill="hold"/>
+                                        <p:tgtEl>
+                                          <p:spTgt spid="10"/>
+                                        </p:tgtEl>
+                                        <p:attrNameLst>
+                                          <p:attrName>ppt_y</p:attrName>
+                                        </p:attrNameLst>
+                                      </p:cBhvr>
+                                      <p:tavLst>
+                                        <p:tav tm="0">
+                                          <p:val>
+                                            <p:strVal val="0-#ppt_h/2"/>
+                                          </p:val>
+                                        </p:tav>
+                                        <p:tav tm="100000">
+                                          <p:val>
+                                            <p:strVal val="#ppt_y"/>
+                                          </p:val>
+                                        </p:tav>
+                                      </p:tavLst>
+                                    </p:anim>
+                                  </p:childTnLst>
+                                </p:cTn>
+                              </p:par>
+                            </p:childTnLst>
+                          </p:cTn>
+                        </p:par>
+                      </p:childTnLst>
+                    </p:cTn>
+                  </p:par>
+                  <p:par>
+                    <p:cTn id="24" fill="hold">
+                      <p:stCondLst>
+                        <p:cond delay="indefinite"/>
+                      </p:stCondLst>
+                      <p:childTnLst>
+                        <p:par>
+                          <p:cTn id="25" fill="hold">
+                            <p:stCondLst>
+                              <p:cond delay="0"/>
+                            </p:stCondLst>
+                            <p:childTnLst>
+                              <p:par>
+                                <p:cTn id="26" presetID="10" presetClass="entr" presetSubtype="0" fill="hold" grpId="0" nodeType="clickEffect">
+                                  <p:stCondLst>
+                                    <p:cond delay="0"/>
+                                  </p:stCondLst>
+                                  <p:childTnLst>
+                                    <p:set>
+                                      <p:cBhvr>
+                                        <p:cTn id="27" dur="1" fill="hold">
+                                          <p:stCondLst>
+                                            <p:cond delay="0"/>
+                                          </p:stCondLst>
+                                        </p:cTn>
+                                        <p:tgtEl>
+                                          <p:spTgt spid="11"/>
+                                        </p:tgtEl>
+                                        <p:attrNameLst>
+                                          <p:attrName>style.visibility</p:attrName>
+                                        </p:attrNameLst>
+                                      </p:cBhvr>
+                                      <p:to>
+                                        <p:strVal val="visible"/>
+                                      </p:to>
+                                    </p:set>
+                                    <p:animEffect transition="in" filter="fade">
+                                      <p:cBhvr>
+                                        <p:cTn id="28" dur="500"/>
+                                        <p:tgtEl>
+                                          <p:spTgt spid="11"/>
+                                        </p:tgtEl>
+                                      </p:cBhvr>
+                                    </p:animEffect>
+                                  </p:childTnLst>
+                                </p:cTn>
+                              </p:par>
+                            </p:childTnLst>
+                          </p:cTn>
+                        </p:par>
+                      </p:childTnLst>
+                    </p:cTn>
+                  </p:par>
+                </p:childTnLst>
+              </p:cTn>
+              <p:prevCondLst>
+                <p:cond evt="onPrev" delay="0">
+                  <p:tgtEl>
+                    <p:sldTgt/>
+                  </p:tgtEl>
+                </p:cond>
+              </p:prevCondLst>
+              <p:nextCondLst>
+                <p:cond evt="onNext" delay="0">
+                  <p:tgtEl>
+                    <p:sldTgt/>
+                  </p:tgtEl>
+                </p:cond>
+              </p:nextCondLst>
+            </p:seq>
+          </p:childTnLst>
+        </p:cTn>
+      </p:par>
+    </p:tnLst>
+    <p:bldLst>
+      <p:bldP spid="10" grpId="0" animBg="1"/>
+      <p:bldP spid="11" grpId="0" animBg="1"/>
+    </p:bldLst>
+  </p:timing>
+</p:sld>
+</file>
+
+<file path=ppt/slides/slide5.xml><?xml version="1.0" encoding="utf-8"?>
+<p:sld xmlns:a="http://schemas.openxmlformats.org/drawingml/2006/main" xmlns:r="http://schemas.openxmlformats.org/officeDocument/2006/relationships" xmlns:p="http://schemas.openxmlformats.org/presentationml/2006/main">
+  <p:cSld>
+    <p:spTree>
+      <p:nvGrpSpPr>
+        <p:cNvPr id="1" name=""/>
+        <p:cNvGrpSpPr/>
+        <p:nvPr/>
+      </p:nvGrpSpPr>
+      <p:grpSpPr>
+        <a:xfrm>
+          <a:off x="0" y="0"/>
+          <a:ext cx="0" cy="0"/>
+          <a:chOff x="0" y="0"/>
+          <a:chExt cx="0" cy="0"/>
+        </a:xfrm>
+      </p:grpSpPr>
+      <p:sp>
+        <p:nvSpPr>
+          <p:cNvPr id="2" name="Title 1"/>
+          <p:cNvSpPr>
+            <a:spLocks noGrp="1"/>
+          </p:cNvSpPr>
+          <p:nvPr>
+            <p:ph type="title" sz="quarter"/>
+          </p:nvPr>
+        </p:nvSpPr>
+        <p:spPr>
+          <a:xfrm>
+            <a:off x="1372474" y="4708098"/>
+            <a:ext cx="6794500" cy="1003300"/>
+          </a:xfrm>
+        </p:spPr>
         <p:txBody>
           <a:bodyPr/>
           <a:lstStyle/>
@@ -6422,7 +7742,7 @@
               <a:pPr>
                 <a:defRPr/>
               </a:pPr>
-              <a:t>3</a:t>
+              <a:t>5</a:t>
             </a:fld>
             <a:endParaRPr lang="en-US" dirty="0"/>
           </a:p>
@@ -6436,7 +7756,7 @@
         </p:nvSpPr>
         <p:spPr>
           <a:xfrm>
-            <a:off x="2479364" y="1448185"/>
+            <a:off x="1955735" y="3720724"/>
             <a:ext cx="4705172" cy="923330"/>
           </a:xfrm>
           <a:prstGeom prst="rect">
@@ -6511,8 +7831,8 @@
         </p:nvSpPr>
         <p:spPr>
           <a:xfrm>
-            <a:off x="1" y="2620342"/>
-            <a:ext cx="9065940" cy="2031325"/>
+            <a:off x="1247796" y="236403"/>
+            <a:ext cx="7676170" cy="830997"/>
           </a:xfrm>
           <a:prstGeom prst="rect">
             <a:avLst/>
@@ -6526,7 +7846,7 @@
           <a:lstStyle/>
           <a:p>
             <a:r>
-              <a:rPr lang="en-US" sz="5400" dirty="0" smtClean="0">
+              <a:rPr lang="en-US" sz="4800" dirty="0" smtClean="0">
                 <a:solidFill>
                   <a:srgbClr val="BB0FAB"/>
                 </a:solidFill>
@@ -6535,7 +7855,7 @@
               <a:t>Disjunctive</a:t>
             </a:r>
             <a:r>
-              <a:rPr lang="en-US" sz="5400" dirty="0" smtClean="0">
+              <a:rPr lang="en-US" sz="4800" dirty="0" smtClean="0">
                 <a:solidFill>
                   <a:srgbClr val="000000"/>
                 </a:solidFill>
@@ -6544,69 +7864,100 @@
               <a:t> </a:t>
             </a:r>
             <a:r>
-              <a:rPr lang="en-US" sz="5400" dirty="0" smtClean="0">
+              <a:rPr lang="en-US" sz="4800" dirty="0" smtClean="0">
                 <a:solidFill>
                   <a:srgbClr val="BB0FAB"/>
                 </a:solidFill>
                 <a:latin typeface="Comic Sans MS" pitchFamily="66" charset="0"/>
               </a:rPr>
-              <a:t>Normal Form</a:t>
-            </a:r>
-          </a:p>
-          <a:p>
-            <a:r>
-              <a:rPr lang="en-US" sz="7200" dirty="0" smtClean="0">
-                <a:solidFill>
-                  <a:srgbClr val="000000"/>
-                </a:solidFill>
-                <a:latin typeface="Comic Sans MS" pitchFamily="66" charset="0"/>
-              </a:rPr>
-              <a:t>(</a:t>
-            </a:r>
-            <a:r>
-              <a:rPr lang="en-US" sz="7200" dirty="0" smtClean="0">
+              <a:t>Normal </a:t>
+            </a:r>
+            <a:r>
+              <a:rPr lang="en-US" sz="4800" dirty="0" smtClean="0">
                 <a:solidFill>
                   <a:srgbClr val="BB0FAB"/>
                 </a:solidFill>
                 <a:latin typeface="Comic Sans MS" pitchFamily="66" charset="0"/>
               </a:rPr>
-              <a:t>DNF</a:t>
-            </a:r>
-            <a:r>
-              <a:rPr lang="en-US" sz="7200" dirty="0" smtClean="0">
-                <a:solidFill>
-                  <a:srgbClr val="000000"/>
-                </a:solidFill>
-                <a:latin typeface="Comic Sans MS" pitchFamily="66" charset="0"/>
-              </a:rPr>
-              <a:t>)</a:t>
-            </a:r>
-            <a:endParaRPr lang="en-US" sz="7200" dirty="0" smtClean="0">
+              <a:t>Form</a:t>
+            </a:r>
+            <a:endParaRPr lang="en-US" sz="4800" dirty="0" smtClean="0">
               <a:solidFill>
-                <a:srgbClr val="000000"/>
+                <a:srgbClr val="BB0FAB"/>
               </a:solidFill>
               <a:latin typeface="Comic Sans MS" pitchFamily="66" charset="0"/>
             </a:endParaRPr>
           </a:p>
         </p:txBody>
       </p:sp>
+      <p:sp>
+        <p:nvSpPr>
+          <p:cNvPr id="5" name="Rectangle 4"/>
+          <p:cNvSpPr/>
+          <p:nvPr/>
+        </p:nvSpPr>
+        <p:spPr>
+          <a:xfrm>
+            <a:off x="3483769" y="1309669"/>
+            <a:ext cx="2163761" cy="923330"/>
+          </a:xfrm>
+          <a:prstGeom prst="rect">
+            <a:avLst/>
+          </a:prstGeom>
+        </p:spPr>
+        <p:txBody>
+          <a:bodyPr wrap="none">
+            <a:spAutoFit/>
+          </a:bodyPr>
+          <a:lstStyle/>
+          <a:p>
+            <a:r>
+              <a:rPr lang="en-US" sz="5400" dirty="0">
+                <a:solidFill>
+                  <a:srgbClr val="000000"/>
+                </a:solidFill>
+                <a:latin typeface="Comic Sans MS" pitchFamily="66" charset="0"/>
+              </a:rPr>
+              <a:t>(</a:t>
+            </a:r>
+            <a:r>
+              <a:rPr lang="en-US" sz="5400" dirty="0">
+                <a:solidFill>
+                  <a:srgbClr val="BB0FAB"/>
+                </a:solidFill>
+                <a:latin typeface="Comic Sans MS" pitchFamily="66" charset="0"/>
+              </a:rPr>
+              <a:t>DNF</a:t>
+            </a:r>
+            <a:r>
+              <a:rPr lang="en-US" sz="5400" dirty="0">
+                <a:solidFill>
+                  <a:srgbClr val="000000"/>
+                </a:solidFill>
+                <a:latin typeface="Comic Sans MS" pitchFamily="66" charset="0"/>
+              </a:rPr>
+              <a:t>)</a:t>
+            </a:r>
+          </a:p>
+        </p:txBody>
+      </p:sp>
     </p:spTree>
     <p:extLst>
       <p:ext uri="{BB962C8B-B14F-4D97-AF65-F5344CB8AC3E}">
-        <p14:creationId xmlns:p14="http://schemas.microsoft.com/office/powerpoint/2010/main" val="34003220"/>
+        <p14:creationId xmlns:p14="http://schemas.microsoft.com/office/powerpoint/2010/main" val="1427140398"/>
       </p:ext>
     </p:extLst>
   </p:cSld>
   <p:clrMapOvr>
     <a:masterClrMapping/>
   </p:clrMapOvr>
-  <p:transition spd="slow" advClick="0">
+  <p:transition xmlns:p14="http://schemas.microsoft.com/office/powerpoint/2010/main" spd="slow" advClick="0">
     <p:fade thruBlk="1"/>
   </p:transition>
   <p:timing>
     <p:tnLst>
       <p:par>
-        <p:cTn id="1" dur="indefinite" restart="never" nodeType="tmRoot">
+        <p:cTn xmlns:p14="http://schemas.microsoft.com/office/powerpoint/2010/main" id="1" dur="indefinite" restart="never" nodeType="tmRoot">
           <p:childTnLst>
             <p:seq concurrent="1" nextAc="seek">
               <p:cTn id="2" dur="indefinite" nodeType="mainSeq">
@@ -6725,109 +8076,6 @@
                       </p:childTnLst>
                     </p:cTn>
                   </p:par>
-                  <p:par>
-                    <p:cTn id="13" fill="hold">
-                      <p:stCondLst>
-                        <p:cond delay="indefinite"/>
-                      </p:stCondLst>
-                      <p:childTnLst>
-                        <p:par>
-                          <p:cTn id="14" fill="hold">
-                            <p:stCondLst>
-                              <p:cond delay="0"/>
-                            </p:stCondLst>
-                            <p:childTnLst>
-                              <p:par>
-                                <p:cTn id="15" presetID="2" presetClass="entr" presetSubtype="6" fill="hold" nodeType="clickEffect">
-                                  <p:stCondLst>
-                                    <p:cond delay="0"/>
-                                  </p:stCondLst>
-                                  <p:childTnLst>
-                                    <p:set>
-                                      <p:cBhvr>
-                                        <p:cTn id="16" dur="1" fill="hold">
-                                          <p:stCondLst>
-                                            <p:cond delay="0"/>
-                                          </p:stCondLst>
-                                        </p:cTn>
-                                        <p:tgtEl>
-                                          <p:spTgt spid="6">
-                                            <p:txEl>
-                                              <p:pRg st="1" end="1"/>
-                                            </p:txEl>
-                                          </p:spTgt>
-                                        </p:tgtEl>
-                                        <p:attrNameLst>
-                                          <p:attrName>style.visibility</p:attrName>
-                                        </p:attrNameLst>
-                                      </p:cBhvr>
-                                      <p:to>
-                                        <p:strVal val="visible"/>
-                                      </p:to>
-                                    </p:set>
-                                    <p:anim calcmode="lin" valueType="num">
-                                      <p:cBhvr additive="base">
-                                        <p:cTn id="17" dur="500" fill="hold"/>
-                                        <p:tgtEl>
-                                          <p:spTgt spid="6">
-                                            <p:txEl>
-                                              <p:pRg st="1" end="1"/>
-                                            </p:txEl>
-                                          </p:spTgt>
-                                        </p:tgtEl>
-                                        <p:attrNameLst>
-                                          <p:attrName>ppt_x</p:attrName>
-                                        </p:attrNameLst>
-                                      </p:cBhvr>
-                                      <p:tavLst>
-                                        <p:tav tm="0">
-                                          <p:val>
-                                            <p:strVal val="1+#ppt_w/2"/>
-                                          </p:val>
-                                        </p:tav>
-                                        <p:tav tm="100000">
-                                          <p:val>
-                                            <p:strVal val="#ppt_x"/>
-                                          </p:val>
-                                        </p:tav>
-                                      </p:tavLst>
-                                    </p:anim>
-                                    <p:anim calcmode="lin" valueType="num">
-                                      <p:cBhvr additive="base">
-                                        <p:cTn id="18" dur="500" fill="hold"/>
-                                        <p:tgtEl>
-                                          <p:spTgt spid="6">
-                                            <p:txEl>
-                                              <p:pRg st="1" end="1"/>
-                                            </p:txEl>
-                                          </p:spTgt>
-                                        </p:tgtEl>
-                                        <p:attrNameLst>
-                                          <p:attrName>ppt_y</p:attrName>
-                                        </p:attrNameLst>
-                                      </p:cBhvr>
-                                      <p:tavLst>
-                                        <p:tav tm="0">
-                                          <p:val>
-                                            <p:strVal val="1+#ppt_h/2"/>
-                                          </p:val>
-                                        </p:tav>
-                                        <p:tav tm="100000">
-                                          <p:val>
-                                            <p:strVal val="#ppt_y"/>
-                                          </p:val>
-                                        </p:tav>
-                                      </p:tavLst>
-                                    </p:anim>
-                                  </p:childTnLst>
-                                </p:cTn>
-                              </p:par>
-                            </p:childTnLst>
-                          </p:cTn>
-                        </p:par>
-                      </p:childTnLst>
-                    </p:cTn>
-                  </p:par>
                 </p:childTnLst>
               </p:cTn>
               <p:prevCondLst>
@@ -6856,338 +8104,7 @@
 </p:sld>
 </file>
 
-<file path=ppt/slides/slide4.xml><?xml version="1.0" encoding="utf-8"?>
-<p:sld xmlns:a="http://schemas.openxmlformats.org/drawingml/2006/main" xmlns:r="http://schemas.openxmlformats.org/officeDocument/2006/relationships" xmlns:p="http://schemas.openxmlformats.org/presentationml/2006/main">
-  <p:cSld>
-    <p:spTree>
-      <p:nvGrpSpPr>
-        <p:cNvPr id="1" name=""/>
-        <p:cNvGrpSpPr/>
-        <p:nvPr/>
-      </p:nvGrpSpPr>
-      <p:grpSpPr>
-        <a:xfrm>
-          <a:off x="0" y="0"/>
-          <a:ext cx="0" cy="0"/>
-          <a:chOff x="0" y="0"/>
-          <a:chExt cx="0" cy="0"/>
-        </a:xfrm>
-      </p:grpSpPr>
-      <p:sp>
-        <p:nvSpPr>
-          <p:cNvPr id="2" name="Title 1"/>
-          <p:cNvSpPr>
-            <a:spLocks noGrp="1"/>
-          </p:cNvSpPr>
-          <p:nvPr>
-            <p:ph type="title" sz="quarter"/>
-          </p:nvPr>
-        </p:nvSpPr>
-        <p:spPr/>
-        <p:txBody>
-          <a:bodyPr/>
-          <a:lstStyle/>
-          <a:p>
-            <a:r>
-              <a:rPr lang="en-US" dirty="0" smtClean="0"/>
-              <a:t>Products (AND’s)</a:t>
-            </a:r>
-            <a:endParaRPr lang="en-US" dirty="0"/>
-          </a:p>
-        </p:txBody>
-      </p:sp>
-      <p:sp>
-        <p:nvSpPr>
-          <p:cNvPr id="3" name="Slide Number Placeholder 2"/>
-          <p:cNvSpPr>
-            <a:spLocks noGrp="1"/>
-          </p:cNvSpPr>
-          <p:nvPr>
-            <p:ph type="sldNum" sz="quarter" idx="10"/>
-          </p:nvPr>
-        </p:nvSpPr>
-        <p:spPr/>
-        <p:txBody>
-          <a:bodyPr/>
-          <a:lstStyle/>
-          <a:p>
-            <a:pPr>
-              <a:defRPr/>
-            </a:pPr>
-            <a:r>
-              <a:rPr lang="en-US" smtClean="0"/>
-              <a:t>forms.</a:t>
-            </a:r>
-            <a:fld id="{068AF58D-0467-409E-A30A-0D5E3A2B197F}" type="slidenum">
-              <a:rPr lang="en-US" smtClean="0"/>
-              <a:pPr>
-                <a:defRPr/>
-              </a:pPr>
-              <a:t>4</a:t>
-            </a:fld>
-            <a:endParaRPr lang="en-US" dirty="0"/>
-          </a:p>
-        </p:txBody>
-      </p:sp>
-      <mc:AlternateContent xmlns:mc="http://schemas.openxmlformats.org/markup-compatibility/2006">
-        <mc:Choice xmlns:a14="http://schemas.microsoft.com/office/drawing/2010/main" Requires="a14">
-          <p:sp>
-            <p:nvSpPr>
-              <p:cNvPr id="7" name="TextBox 6"/>
-              <p:cNvSpPr txBox="1"/>
-              <p:nvPr/>
-            </p:nvSpPr>
-            <p:spPr>
-              <a:xfrm>
-                <a:off x="1560290" y="2182295"/>
-                <a:ext cx="862031" cy="923330"/>
-              </a:xfrm>
-              <a:prstGeom prst="rect">
-                <a:avLst/>
-              </a:prstGeom>
-              <a:noFill/>
-            </p:spPr>
-            <p:txBody>
-              <a:bodyPr wrap="none" rtlCol="0">
-                <a:spAutoFit/>
-              </a:bodyPr>
-              <a:lstStyle/>
-              <a:p>
-                <a:pPr algn="l"/>
-                <a14:m>
-                  <m:oMathPara xmlns:m="http://schemas.openxmlformats.org/officeDocument/2006/math">
-                    <m:oMathParaPr>
-                      <m:jc m:val="centerGroup"/>
-                    </m:oMathParaPr>
-                    <m:oMath xmlns:m="http://schemas.openxmlformats.org/officeDocument/2006/math">
-                      <m:acc>
-                        <m:accPr>
-                          <m:chr m:val="̅"/>
-                          <m:ctrlPr>
-                            <a:rPr lang="en-US" sz="5400" dirty="0" smtClean="0">
-                              <a:latin typeface="Comic Sans MS Regular" charset="0"/>
-                            </a:rPr>
-                          </m:ctrlPr>
-                        </m:accPr>
-                        <m:e>
-                          <m:r>
-                            <a:rPr lang="en-US" sz="5400" dirty="0" smtClean="0">
-                              <a:latin typeface="Comic Sans MS Regular" charset="0"/>
-                            </a:rPr>
-                            <m:t>𝑃</m:t>
-                          </m:r>
-                        </m:e>
-                      </m:acc>
-                    </m:oMath>
-                  </m:oMathPara>
-                </a14:m>
-                <a:endParaRPr lang="en-US" sz="5400" dirty="0" smtClean="0">
-                  <a:latin typeface="Comic Sans MS" pitchFamily="66" charset="0"/>
-                </a:endParaRPr>
-              </a:p>
-            </p:txBody>
-          </p:sp>
-        </mc:Choice>
-        <mc:Fallback>
-          <p:sp>
-            <p:nvSpPr>
-              <p:cNvPr id="7" name="TextBox 6"/>
-              <p:cNvSpPr txBox="1">
-                <a:spLocks noRot="1" noChangeAspect="1" noMove="1" noResize="1" noEditPoints="1" noAdjustHandles="1" noChangeArrowheads="1" noChangeShapeType="1" noTextEdit="1"/>
-              </p:cNvSpPr>
-              <p:nvPr/>
-            </p:nvSpPr>
-            <p:spPr>
-              <a:xfrm>
-                <a:off x="1560290" y="2182295"/>
-                <a:ext cx="862031" cy="923330"/>
-              </a:xfrm>
-              <a:prstGeom prst="rect">
-                <a:avLst/>
-              </a:prstGeom>
-              <a:blipFill rotWithShape="0">
-                <a:blip r:embed="rId2"/>
-                <a:stretch>
-                  <a:fillRect/>
-                </a:stretch>
-              </a:blipFill>
-            </p:spPr>
-            <p:txBody>
-              <a:bodyPr/>
-              <a:lstStyle/>
-              <a:p>
-                <a:r>
-                  <a:rPr lang="en-US">
-                    <a:noFill/>
-                  </a:rPr>
-                  <a:t> </a:t>
-                </a:r>
-              </a:p>
-            </p:txBody>
-          </p:sp>
-        </mc:Fallback>
-      </mc:AlternateContent>
-      <p:sp>
-        <p:nvSpPr>
-          <p:cNvPr id="8" name="TextBox 7"/>
-          <p:cNvSpPr txBox="1"/>
-          <p:nvPr/>
-        </p:nvSpPr>
-        <p:spPr>
-          <a:xfrm>
-            <a:off x="1438507" y="2182295"/>
-            <a:ext cx="5542156" cy="2308324"/>
-          </a:xfrm>
-          <a:prstGeom prst="rect">
-            <a:avLst/>
-          </a:prstGeom>
-          <a:noFill/>
-        </p:spPr>
-        <p:txBody>
-          <a:bodyPr wrap="square" rtlCol="0">
-            <a:spAutoFit/>
-          </a:bodyPr>
-          <a:lstStyle/>
-          <a:p>
-            <a:pPr algn="l"/>
-            <a:r>
-              <a:rPr lang="en-US" sz="4400" dirty="0" smtClean="0">
-                <a:latin typeface="Comic Sans MS" pitchFamily="66" charset="0"/>
-              </a:rPr>
-              <a:t>( </a:t>
-            </a:r>
-            <a:r>
-              <a:rPr lang="en-US" sz="3600" dirty="0" smtClean="0">
-                <a:latin typeface="Comic Sans MS" pitchFamily="66" charset="0"/>
-              </a:rPr>
-              <a:t>   AND </a:t>
-            </a:r>
-            <a:r>
-              <a:rPr lang="en-US" sz="4800" i="1" dirty="0" smtClean="0">
-                <a:latin typeface="Comic Sans MS" pitchFamily="66" charset="0"/>
-              </a:rPr>
-              <a:t>Q</a:t>
-            </a:r>
-            <a:r>
-              <a:rPr lang="en-US" sz="4800" dirty="0" smtClean="0">
-                <a:latin typeface="Comic Sans MS" pitchFamily="66" charset="0"/>
-              </a:rPr>
-              <a:t>)</a:t>
-            </a:r>
-          </a:p>
-          <a:p>
-            <a:pPr algn="l"/>
-            <a:r>
-              <a:rPr lang="en-US" sz="4400" dirty="0" smtClean="0">
-                <a:latin typeface="Comic Sans MS" pitchFamily="66" charset="0"/>
-              </a:rPr>
-              <a:t>(</a:t>
-            </a:r>
-            <a:r>
-              <a:rPr lang="en-US" sz="4800" i="1" dirty="0" smtClean="0">
-                <a:latin typeface="Comic Sans MS" pitchFamily="66" charset="0"/>
-              </a:rPr>
-              <a:t>P</a:t>
-            </a:r>
-            <a:r>
-              <a:rPr lang="en-US" sz="3600" i="1" dirty="0" smtClean="0">
-                <a:latin typeface="Comic Sans MS" pitchFamily="66" charset="0"/>
-              </a:rPr>
-              <a:t> </a:t>
-            </a:r>
-            <a:r>
-              <a:rPr lang="en-US" sz="3600" dirty="0" smtClean="0">
-                <a:latin typeface="Comic Sans MS" pitchFamily="66" charset="0"/>
-              </a:rPr>
-              <a:t> </a:t>
-            </a:r>
-            <a:r>
-              <a:rPr lang="en-US" sz="3600" dirty="0">
-                <a:latin typeface="Comic Sans MS" pitchFamily="66" charset="0"/>
-              </a:rPr>
-              <a:t>AND </a:t>
-            </a:r>
-            <a:r>
-              <a:rPr lang="en-US" sz="4800" i="1" dirty="0" smtClean="0">
-                <a:latin typeface="Comic Sans MS" pitchFamily="66" charset="0"/>
-              </a:rPr>
-              <a:t>Q </a:t>
-            </a:r>
-            <a:r>
-              <a:rPr lang="en-US" sz="3600" dirty="0">
-                <a:latin typeface="Comic Sans MS" pitchFamily="66" charset="0"/>
-              </a:rPr>
-              <a:t>AND</a:t>
-            </a:r>
-            <a:r>
-              <a:rPr lang="en-US" sz="4000" dirty="0">
-                <a:latin typeface="Comic Sans MS" pitchFamily="66" charset="0"/>
-              </a:rPr>
-              <a:t> </a:t>
-            </a:r>
-            <a:r>
-              <a:rPr lang="en-US" sz="4800" i="1" dirty="0" smtClean="0">
-                <a:latin typeface="Comic Sans MS" pitchFamily="66" charset="0"/>
-              </a:rPr>
-              <a:t>R</a:t>
-            </a:r>
-            <a:r>
-              <a:rPr lang="en-US" sz="4800" dirty="0" smtClean="0">
-                <a:latin typeface="Comic Sans MS" pitchFamily="66" charset="0"/>
-              </a:rPr>
-              <a:t>)</a:t>
-            </a:r>
-          </a:p>
-          <a:p>
-            <a:pPr algn="l"/>
-            <a:r>
-              <a:rPr lang="en-US" sz="4800" dirty="0">
-                <a:latin typeface="Comic Sans MS" pitchFamily="66" charset="0"/>
-              </a:rPr>
-              <a:t> </a:t>
-            </a:r>
-            <a:r>
-              <a:rPr lang="en-US" sz="4800" dirty="0" smtClean="0">
-                <a:latin typeface="Comic Sans MS" pitchFamily="66" charset="0"/>
-              </a:rPr>
-              <a:t>   </a:t>
-            </a:r>
-            <a:r>
-              <a:rPr lang="en-US" sz="4800" i="1" dirty="0" smtClean="0">
-                <a:latin typeface="Comic Sans MS" pitchFamily="66" charset="0"/>
-              </a:rPr>
-              <a:t>P</a:t>
-            </a:r>
-            <a:endParaRPr lang="en-US" sz="4800" i="1" dirty="0">
-              <a:latin typeface="Comic Sans MS" pitchFamily="66" charset="0"/>
-            </a:endParaRPr>
-          </a:p>
-        </p:txBody>
-      </p:sp>
-    </p:spTree>
-    <p:extLst>
-      <p:ext uri="{BB962C8B-B14F-4D97-AF65-F5344CB8AC3E}">
-        <p14:creationId xmlns:p14="http://schemas.microsoft.com/office/powerpoint/2010/main" val="275679610"/>
-      </p:ext>
-    </p:extLst>
-  </p:cSld>
-  <p:clrMapOvr>
-    <a:masterClrMapping/>
-  </p:clrMapOvr>
-  <p:transition>
-    <p:fade/>
-  </p:transition>
-  <p:timing>
-    <p:tnLst>
-      <p:par>
-        <p:cTn id="1" dur="indefinite" restart="never" nodeType="tmRoot"/>
-      </p:par>
-    </p:tnLst>
-  </p:timing>
-</p:sld>
-</file>
-
-<file path=ppt/slides/slide5.xml><?xml version="1.0" encoding="utf-8"?>
+<file path=ppt/slides/slide6.xml><?xml version="1.0" encoding="utf-8"?>
 <p:sld xmlns:a="http://schemas.openxmlformats.org/drawingml/2006/main" xmlns:r="http://schemas.openxmlformats.org/officeDocument/2006/relationships" xmlns:p="http://schemas.openxmlformats.org/presentationml/2006/main">
   <p:cSld>
     <p:spTree>
@@ -7236,7 +8153,7 @@
               <a:pPr>
                 <a:defRPr/>
               </a:pPr>
-              <a:t>5</a:t>
+              <a:t>6</a:t>
             </a:fld>
             <a:endParaRPr lang="en-US" dirty="0"/>
           </a:p>
@@ -8755,20 +9672,20 @@
   <p:clrMapOvr>
     <a:masterClrMapping/>
   </p:clrMapOvr>
-  <p:transition spd="slow" advClick="0">
+  <p:transition xmlns:p14="http://schemas.microsoft.com/office/powerpoint/2010/main" spd="slow" advClick="0">
     <p:fade thruBlk="1"/>
   </p:transition>
   <p:timing>
     <p:tnLst>
       <p:par>
-        <p:cTn id="1" dur="indefinite" restart="never" nodeType="tmRoot"/>
+        <p:cTn xmlns:p14="http://schemas.microsoft.com/office/powerpoint/2010/main" id="1" dur="indefinite" restart="never" nodeType="tmRoot"/>
       </p:par>
     </p:tnLst>
   </p:timing>
 </p:sld>
 </file>
 
-<file path=ppt/slides/slide6.xml><?xml version="1.0" encoding="utf-8"?>
+<file path=ppt/slides/slide7.xml><?xml version="1.0" encoding="utf-8"?>
 <p:sld xmlns:a="http://schemas.openxmlformats.org/drawingml/2006/main" xmlns:r="http://schemas.openxmlformats.org/officeDocument/2006/relationships" xmlns:p="http://schemas.openxmlformats.org/presentationml/2006/main">
   <p:cSld>
     <p:spTree>
@@ -8807,7 +9724,7 @@
           <a:graphicData uri="http://schemas.openxmlformats.org/presentationml/2006/ole">
             <mc:AlternateContent xmlns:mc="http://schemas.openxmlformats.org/markup-compatibility/2006">
               <mc:Choice xmlns:v="urn:schemas-microsoft-com:vml" Requires="v">
-                <p:oleObj spid="_x0000_s1066" name="Equation" r:id="rId3" imgW="939800" imgH="469900" progId="Equation.DSMT4">
+                <p:oleObj spid="_x0000_s1071" name="Equation" r:id="rId3" imgW="939800" imgH="469900" progId="Equation.DSMT4">
                   <p:embed/>
                 </p:oleObj>
               </mc:Choice>
@@ -8904,7 +9821,7 @@
               <a:pPr>
                 <a:defRPr/>
               </a:pPr>
-              <a:t>6</a:t>
+              <a:t>7</a:t>
             </a:fld>
             <a:endParaRPr lang="en-US" dirty="0"/>
           </a:p>
@@ -8997,7 +9914,7 @@
           <a:graphicData uri="http://schemas.openxmlformats.org/presentationml/2006/ole">
             <mc:AlternateContent xmlns:mc="http://schemas.openxmlformats.org/markup-compatibility/2006">
               <mc:Choice xmlns:v="urn:schemas-microsoft-com:vml" Requires="v">
-                <p:oleObj spid="_x0000_s1067" name="Equation" r:id="rId5" imgW="1066800" imgH="254000" progId="Equation.DSMT4">
+                <p:oleObj spid="_x0000_s1072" name="Equation" r:id="rId5" imgW="1066800" imgH="254000" progId="Equation.DSMT4">
                   <p:embed/>
                 </p:oleObj>
               </mc:Choice>
@@ -9042,13 +9959,13 @@
   <p:clrMapOvr>
     <a:masterClrMapping/>
   </p:clrMapOvr>
-  <p:transition spd="slow" advClick="0">
+  <p:transition xmlns:p14="http://schemas.microsoft.com/office/powerpoint/2010/main" spd="slow" advClick="0">
     <p:fade/>
   </p:transition>
   <p:timing>
     <p:tnLst>
       <p:par>
-        <p:cTn id="1" dur="indefinite" restart="never" nodeType="tmRoot">
+        <p:cTn xmlns:p14="http://schemas.microsoft.com/office/powerpoint/2010/main" id="1" dur="indefinite" restart="never" nodeType="tmRoot">
           <p:childTnLst>
             <p:seq concurrent="1" nextAc="seek">
               <p:cTn id="2" dur="indefinite" nodeType="mainSeq">
@@ -9240,7 +10157,7 @@
 </p:sld>
 </file>
 
-<file path=ppt/slides/slide7.xml><?xml version="1.0" encoding="utf-8"?>
+<file path=ppt/slides/slide8.xml><?xml version="1.0" encoding="utf-8"?>
 <p:sld xmlns:a="http://schemas.openxmlformats.org/drawingml/2006/main" xmlns:r="http://schemas.openxmlformats.org/officeDocument/2006/relationships" xmlns:p="http://schemas.openxmlformats.org/presentationml/2006/main">
   <p:cSld>
     <p:spTree>
@@ -9279,7 +10196,7 @@
           <a:graphicData uri="http://schemas.openxmlformats.org/presentationml/2006/ole">
             <mc:AlternateContent xmlns:mc="http://schemas.openxmlformats.org/markup-compatibility/2006">
               <mc:Choice xmlns:v="urn:schemas-microsoft-com:vml" Requires="v">
-                <p:oleObj spid="_x0000_s2070" name="Equation" r:id="rId3" imgW="1003300" imgH="482600" progId="Equation.DSMT4">
+                <p:oleObj spid="_x0000_s2073" name="Equation" r:id="rId3" imgW="1003300" imgH="482600" progId="Equation.DSMT4">
                   <p:embed/>
                 </p:oleObj>
               </mc:Choice>
@@ -9396,7 +10313,7 @@
               <a:pPr>
                 <a:defRPr/>
               </a:pPr>
-              <a:t>7</a:t>
+              <a:t>8</a:t>
             </a:fld>
             <a:endParaRPr lang="en-US" dirty="0"/>
           </a:p>
@@ -9453,13 +10370,13 @@
   <p:clrMapOvr>
     <a:masterClrMapping/>
   </p:clrMapOvr>
-  <p:transition spd="slow" advClick="0">
+  <p:transition xmlns:p14="http://schemas.microsoft.com/office/powerpoint/2010/main" spd="slow" advClick="0">
     <p:fade/>
   </p:transition>
   <p:timing>
     <p:tnLst>
       <p:par>
-        <p:cTn id="1" dur="indefinite" restart="never" nodeType="tmRoot">
+        <p:cTn xmlns:p14="http://schemas.microsoft.com/office/powerpoint/2010/main" id="1" dur="indefinite" restart="never" nodeType="tmRoot">
           <p:childTnLst>
             <p:seq concurrent="1" nextAc="seek">
               <p:cTn id="2" dur="indefinite" nodeType="mainSeq">
@@ -9598,7 +10515,7 @@
 </p:sld>
 </file>
 
-<file path=ppt/slides/slide8.xml><?xml version="1.0" encoding="utf-8"?>
+<file path=ppt/slides/slide9.xml><?xml version="1.0" encoding="utf-8"?>
 <p:sld xmlns:a="http://schemas.openxmlformats.org/drawingml/2006/main" xmlns:r="http://schemas.openxmlformats.org/officeDocument/2006/relationships" xmlns:p="http://schemas.openxmlformats.org/presentationml/2006/main">
   <p:cSld>
     <p:spTree>
@@ -9637,7 +10554,7 @@
           <a:graphicData uri="http://schemas.openxmlformats.org/presentationml/2006/ole">
             <mc:AlternateContent xmlns:mc="http://schemas.openxmlformats.org/markup-compatibility/2006">
               <mc:Choice xmlns:v="urn:schemas-microsoft-com:vml" Requires="v">
-                <p:oleObj spid="_x0000_s13325" name="Equation" r:id="rId3" imgW="533400" imgH="914400" progId="Equation.DSMT4">
+                <p:oleObj spid="_x0000_s13328" name="Equation" r:id="rId3" imgW="533400" imgH="914400" progId="Equation.DSMT4">
                   <p:embed/>
                 </p:oleObj>
               </mc:Choice>
@@ -9754,7 +10671,7 @@
               <a:pPr>
                 <a:defRPr/>
               </a:pPr>
-              <a:t>8</a:t>
+              <a:t>9</a:t>
             </a:fld>
             <a:endParaRPr lang="en-US" dirty="0"/>
           </a:p>
@@ -9785,181 +10702,7 @@
   <p:timing>
     <p:tnLst>
       <p:par>
-        <p:cTn id="1" dur="indefinite" restart="never" nodeType="tmRoot"/>
-      </p:par>
-    </p:tnLst>
-  </p:timing>
-</p:sld>
-</file>
-
-<file path=ppt/slides/slide9.xml><?xml version="1.0" encoding="utf-8"?>
-<p:sld xmlns:a="http://schemas.openxmlformats.org/drawingml/2006/main" xmlns:r="http://schemas.openxmlformats.org/officeDocument/2006/relationships" xmlns:p="http://schemas.openxmlformats.org/presentationml/2006/main">
-  <p:cSld>
-    <p:spTree>
-      <p:nvGrpSpPr>
-        <p:cNvPr id="1" name=""/>
-        <p:cNvGrpSpPr/>
-        <p:nvPr/>
-      </p:nvGrpSpPr>
-      <p:grpSpPr>
-        <a:xfrm>
-          <a:off x="0" y="0"/>
-          <a:ext cx="0" cy="0"/>
-          <a:chOff x="0" y="0"/>
-          <a:chExt cx="0" cy="0"/>
-        </a:xfrm>
-      </p:grpSpPr>
-      <p:graphicFrame>
-        <p:nvGraphicFramePr>
-          <p:cNvPr id="6" name="Object 5"/>
-          <p:cNvGraphicFramePr>
-            <a:graphicFrameLocks noChangeAspect="1"/>
-          </p:cNvGraphicFramePr>
-          <p:nvPr>
-            <p:extLst>
-              <p:ext uri="{D42A27DB-BD31-4B8C-83A1-F6EECF244321}">
-                <p14:modId xmlns:p14="http://schemas.microsoft.com/office/powerpoint/2010/main" val="2607417037"/>
-              </p:ext>
-            </p:extLst>
-          </p:nvPr>
-        </p:nvGraphicFramePr>
-        <p:xfrm>
-          <a:off x="3246996" y="1147402"/>
-          <a:ext cx="2662707" cy="4440637"/>
-        </p:xfrm>
-        <a:graphic>
-          <a:graphicData uri="http://schemas.openxmlformats.org/presentationml/2006/ole">
-            <mc:AlternateContent xmlns:mc="http://schemas.openxmlformats.org/markup-compatibility/2006">
-              <mc:Choice xmlns:v="urn:schemas-microsoft-com:vml" Requires="v">
-                <p:oleObj spid="_x0000_s12301" name="Equation" r:id="rId3" imgW="533400" imgH="914400" progId="Equation.DSMT4">
-                  <p:embed/>
-                </p:oleObj>
-              </mc:Choice>
-              <mc:Fallback>
-                <p:oleObj name="Equation" r:id="rId3" imgW="533400" imgH="914400" progId="Equation.DSMT4">
-                  <p:embed/>
-                  <p:pic>
-                    <p:nvPicPr>
-                      <p:cNvPr id="0" name=""/>
-                      <p:cNvPicPr/>
-                      <p:nvPr/>
-                    </p:nvPicPr>
-                    <p:blipFill>
-                      <a:blip r:embed="rId4"/>
-                      <a:stretch>
-                        <a:fillRect/>
-                      </a:stretch>
-                    </p:blipFill>
-                    <p:spPr>
-                      <a:xfrm>
-                        <a:off x="3246996" y="1147402"/>
-                        <a:ext cx="2662707" cy="4440637"/>
-                      </a:xfrm>
-                      <a:prstGeom prst="rect">
-                        <a:avLst/>
-                      </a:prstGeom>
-                    </p:spPr>
-                  </p:pic>
-                </p:oleObj>
-              </mc:Fallback>
-            </mc:AlternateContent>
-          </a:graphicData>
-        </a:graphic>
-      </p:graphicFrame>
-      <p:sp>
-        <p:nvSpPr>
-          <p:cNvPr id="3" name="Slide Number Placeholder 2"/>
-          <p:cNvSpPr>
-            <a:spLocks noGrp="1"/>
-          </p:cNvSpPr>
-          <p:nvPr>
-            <p:ph type="sldNum" sz="quarter" idx="10"/>
-          </p:nvPr>
-        </p:nvSpPr>
-        <p:spPr/>
-        <p:txBody>
-          <a:bodyPr/>
-          <a:lstStyle/>
-          <a:p>
-            <a:pPr>
-              <a:defRPr/>
-            </a:pPr>
-            <a:r>
-              <a:rPr lang="en-US" smtClean="0"/>
-              <a:t>forms.</a:t>
-            </a:r>
-            <a:fld id="{068AF58D-0467-409E-A30A-0D5E3A2B197F}" type="slidenum">
-              <a:rPr lang="en-US" smtClean="0"/>
-              <a:pPr>
-                <a:defRPr/>
-              </a:pPr>
-              <a:t>9</a:t>
-            </a:fld>
-            <a:endParaRPr lang="en-US" dirty="0"/>
-          </a:p>
-        </p:txBody>
-      </p:sp>
-      <p:sp>
-        <p:nvSpPr>
-          <p:cNvPr id="7" name="Title 1"/>
-          <p:cNvSpPr>
-            <a:spLocks noGrp="1"/>
-          </p:cNvSpPr>
-          <p:nvPr>
-            <p:ph type="title" sz="quarter"/>
-          </p:nvPr>
-        </p:nvSpPr>
-        <p:spPr/>
-        <p:txBody>
-          <a:bodyPr/>
-          <a:lstStyle/>
-          <a:p>
-            <a:r>
-              <a:rPr lang="en-US" dirty="0" smtClean="0"/>
-              <a:t>Disjunctive Form for </a:t>
-            </a:r>
-            <a:r>
-              <a:rPr lang="en-US" dirty="0" smtClean="0">
-                <a:solidFill>
-                  <a:srgbClr val="0000FF"/>
-                </a:solidFill>
-              </a:rPr>
-              <a:t>M</a:t>
-            </a:r>
-            <a:endParaRPr lang="en-US" dirty="0">
-              <a:solidFill>
-                <a:srgbClr val="0000FF"/>
-              </a:solidFill>
-            </a:endParaRPr>
-          </a:p>
-        </p:txBody>
-      </p:sp>
-    </p:spTree>
-    <p:extLst>
-      <p:ext uri="{BB962C8B-B14F-4D97-AF65-F5344CB8AC3E}">
-        <p14:creationId xmlns:p14="http://schemas.microsoft.com/office/powerpoint/2010/main" val="3206481017"/>
-      </p:ext>
-    </p:extLst>
-  </p:cSld>
-  <p:clrMapOvr>
-    <a:masterClrMapping/>
-  </p:clrMapOvr>
-  <mc:AlternateContent xmlns:mc="http://schemas.openxmlformats.org/markup-compatibility/2006" xmlns:p14="http://schemas.microsoft.com/office/powerpoint/2010/main">
-    <mc:Choice Requires="p14">
-      <p:transition spd="med" p14:dur="700" advClick="0">
-        <p:fade/>
-      </p:transition>
-    </mc:Choice>
-    <mc:Fallback xmlns="">
-      <p:transition xmlns:p14="http://schemas.microsoft.com/office/powerpoint/2010/main" spd="med" advClick="0">
-        <p:fade/>
-      </p:transition>
-    </mc:Fallback>
-  </mc:AlternateContent>
-  <p:timing>
-    <p:tnLst>
-      <p:par>
-        <p:cTn id="1" dur="indefinite" restart="never" nodeType="tmRoot"/>
+        <p:cTn xmlns:p14="http://schemas.microsoft.com/office/powerpoint/2010/main" id="1" dur="indefinite" restart="never" nodeType="tmRoot"/>
       </p:par>
     </p:tnLst>
   </p:timing>

</xml_diff>